<commit_message>
FEAT:Add To-Do List UseCase
</commit_message>
<xml_diff>
--- a/Diagrammes_Cas_Dusages/DiagrammeUseCase.pptx
+++ b/Diagrammes_Cas_Dusages/DiagrammeUseCase.pptx
@@ -10,29 +10,30 @@
     <p:sldId id="259" r:id="rId4"/>
     <p:sldId id="260" r:id="rId5"/>
     <p:sldId id="261" r:id="rId6"/>
-    <p:sldId id="256" r:id="rId7"/>
+    <p:sldId id="262" r:id="rId7"/>
+    <p:sldId id="256" r:id="rId8"/>
   </p:sldIdLst>
   <p:sldSz cx="12192000" cy="6858000"/>
   <p:notesSz cx="6858000" cy="9144000"/>
   <p:embeddedFontLst>
     <p:embeddedFont>
       <p:font typeface="Calibri" panose="020F0502020204030204" pitchFamily="34" charset="0"/>
-      <p:regular r:id="rId8"/>
-      <p:bold r:id="rId9"/>
-      <p:italic r:id="rId10"/>
-      <p:boldItalic r:id="rId11"/>
+      <p:regular r:id="rId9"/>
+      <p:bold r:id="rId10"/>
+      <p:italic r:id="rId11"/>
+      <p:boldItalic r:id="rId12"/>
     </p:embeddedFont>
     <p:embeddedFont>
       <p:font typeface="Calibri Light" panose="020F0302020204030204" pitchFamily="34" charset="0"/>
-      <p:regular r:id="rId12"/>
-      <p:italic r:id="rId13"/>
+      <p:regular r:id="rId13"/>
+      <p:italic r:id="rId14"/>
     </p:embeddedFont>
     <p:embeddedFont>
       <p:font typeface="Roboto" panose="02000000000000000000" pitchFamily="2" charset="0"/>
-      <p:regular r:id="rId14"/>
-      <p:bold r:id="rId15"/>
-      <p:italic r:id="rId16"/>
-      <p:boldItalic r:id="rId17"/>
+      <p:regular r:id="rId15"/>
+      <p:bold r:id="rId16"/>
+      <p:italic r:id="rId17"/>
+      <p:boldItalic r:id="rId18"/>
     </p:embeddedFont>
   </p:embeddedFontLst>
   <p:defaultTextStyle>
@@ -10933,6 +10934,1818 @@
 </file>
 
 <file path=ppt/slides/slide6.xml><?xml version="1.0" encoding="utf-8"?>
+<p:sld xmlns:a="http://schemas.openxmlformats.org/drawingml/2006/main" xmlns:r="http://schemas.openxmlformats.org/officeDocument/2006/relationships" xmlns:p="http://schemas.openxmlformats.org/presentationml/2006/main">
+  <p:cSld>
+    <p:bg>
+      <p:bgPr>
+        <a:solidFill>
+          <a:schemeClr val="bg1"/>
+        </a:solidFill>
+        <a:effectLst/>
+      </p:bgPr>
+    </p:bg>
+    <p:spTree>
+      <p:nvGrpSpPr>
+        <p:cNvPr id="1" name=""/>
+        <p:cNvGrpSpPr/>
+        <p:nvPr/>
+      </p:nvGrpSpPr>
+      <p:grpSpPr>
+        <a:xfrm>
+          <a:off x="0" y="0"/>
+          <a:ext cx="0" cy="0"/>
+          <a:chOff x="0" y="0"/>
+          <a:chExt cx="0" cy="0"/>
+        </a:xfrm>
+      </p:grpSpPr>
+      <p:sp useBgFill="1">
+        <p:nvSpPr>
+          <p:cNvPr id="8" name="Rectangle 7">
+            <a:extLst>
+              <a:ext uri="{FF2B5EF4-FFF2-40B4-BE49-F238E27FC236}">
+                <a16:creationId xmlns:a16="http://schemas.microsoft.com/office/drawing/2014/main" id="{907EF6B7-1338-4443-8C46-6A318D952DFD}"/>
+              </a:ext>
+              <a:ext uri="{C183D7F6-B498-43B3-948B-1728B52AA6E4}">
+                <adec:decorative xmlns:adec="http://schemas.microsoft.com/office/drawing/2017/decorative" val="1"/>
+              </a:ext>
+            </a:extLst>
+          </p:cNvPr>
+          <p:cNvSpPr>
+            <a:spLocks noGrp="1" noRot="1" noChangeAspect="1" noMove="1" noResize="1" noEditPoints="1" noAdjustHandles="1" noChangeArrowheads="1" noChangeShapeType="1" noTextEdit="1"/>
+          </p:cNvSpPr>
+          <p:nvPr>
+            <p:extLst>
+              <p:ext uri="{386F3935-93C4-4BCD-93E2-E3B085C9AB24}">
+                <p16:designElem xmlns:p16="http://schemas.microsoft.com/office/powerpoint/2015/main" val="1"/>
+              </p:ext>
+            </p:extLst>
+          </p:nvPr>
+        </p:nvSpPr>
+        <p:spPr>
+          <a:xfrm>
+            <a:off x="3048" y="0"/>
+            <a:ext cx="12188952" cy="6858000"/>
+          </a:xfrm>
+          <a:prstGeom prst="rect">
+            <a:avLst/>
+          </a:prstGeom>
+          <a:ln>
+            <a:noFill/>
+          </a:ln>
+        </p:spPr>
+        <p:style>
+          <a:lnRef idx="2">
+            <a:schemeClr val="accent1">
+              <a:shade val="50000"/>
+            </a:schemeClr>
+          </a:lnRef>
+          <a:fillRef idx="1">
+            <a:schemeClr val="accent1"/>
+          </a:fillRef>
+          <a:effectRef idx="0">
+            <a:schemeClr val="accent1"/>
+          </a:effectRef>
+          <a:fontRef idx="minor">
+            <a:schemeClr val="lt1"/>
+          </a:fontRef>
+        </p:style>
+        <p:txBody>
+          <a:bodyPr rtlCol="0" anchor="ctr"/>
+          <a:lstStyle/>
+          <a:p>
+            <a:pPr algn="ctr"/>
+            <a:endParaRPr lang="en-US"/>
+          </a:p>
+        </p:txBody>
+      </p:sp>
+      <p:sp>
+        <p:nvSpPr>
+          <p:cNvPr id="10" name="Freeform: Shape 9">
+            <a:extLst>
+              <a:ext uri="{FF2B5EF4-FFF2-40B4-BE49-F238E27FC236}">
+                <a16:creationId xmlns:a16="http://schemas.microsoft.com/office/drawing/2014/main" id="{DAAE4CDD-124C-4DCF-9584-B6033B545DD5}"/>
+              </a:ext>
+              <a:ext uri="{C183D7F6-B498-43B3-948B-1728B52AA6E4}">
+                <adec:decorative xmlns:adec="http://schemas.microsoft.com/office/drawing/2017/decorative" val="1"/>
+              </a:ext>
+            </a:extLst>
+          </p:cNvPr>
+          <p:cNvSpPr>
+            <a:spLocks noGrp="1" noRot="1" noChangeAspect="1" noMove="1" noResize="1" noEditPoints="1" noAdjustHandles="1" noChangeArrowheads="1" noChangeShapeType="1" noTextEdit="1"/>
+          </p:cNvSpPr>
+          <p:nvPr>
+            <p:extLst>
+              <p:ext uri="{386F3935-93C4-4BCD-93E2-E3B085C9AB24}">
+                <p16:designElem xmlns:p16="http://schemas.microsoft.com/office/powerpoint/2015/main" val="1"/>
+              </p:ext>
+            </p:extLst>
+          </p:nvPr>
+        </p:nvSpPr>
+        <p:spPr>
+          <a:xfrm>
+            <a:off x="1" y="0"/>
+            <a:ext cx="4167271" cy="6858000"/>
+          </a:xfrm>
+          <a:custGeom>
+            <a:avLst/>
+            <a:gdLst>
+              <a:gd name="connsiteX0" fmla="*/ 0 w 4167271"/>
+              <a:gd name="connsiteY0" fmla="*/ 0 h 6858000"/>
+              <a:gd name="connsiteX1" fmla="*/ 2259550 w 4167271"/>
+              <a:gd name="connsiteY1" fmla="*/ 0 h 6858000"/>
+              <a:gd name="connsiteX2" fmla="*/ 2387803 w 4167271"/>
+              <a:gd name="connsiteY2" fmla="*/ 82222 h 6858000"/>
+              <a:gd name="connsiteX3" fmla="*/ 4167271 w 4167271"/>
+              <a:gd name="connsiteY3" fmla="*/ 3429000 h 6858000"/>
+              <a:gd name="connsiteX4" fmla="*/ 2387803 w 4167271"/>
+              <a:gd name="connsiteY4" fmla="*/ 6775779 h 6858000"/>
+              <a:gd name="connsiteX5" fmla="*/ 2259550 w 4167271"/>
+              <a:gd name="connsiteY5" fmla="*/ 6858000 h 6858000"/>
+              <a:gd name="connsiteX6" fmla="*/ 0 w 4167271"/>
+              <a:gd name="connsiteY6" fmla="*/ 6858000 h 6858000"/>
+            </a:gdLst>
+            <a:ahLst/>
+            <a:cxnLst>
+              <a:cxn ang="0">
+                <a:pos x="connsiteX0" y="connsiteY0"/>
+              </a:cxn>
+              <a:cxn ang="0">
+                <a:pos x="connsiteX1" y="connsiteY1"/>
+              </a:cxn>
+              <a:cxn ang="0">
+                <a:pos x="connsiteX2" y="connsiteY2"/>
+              </a:cxn>
+              <a:cxn ang="0">
+                <a:pos x="connsiteX3" y="connsiteY3"/>
+              </a:cxn>
+              <a:cxn ang="0">
+                <a:pos x="connsiteX4" y="connsiteY4"/>
+              </a:cxn>
+              <a:cxn ang="0">
+                <a:pos x="connsiteX5" y="connsiteY5"/>
+              </a:cxn>
+              <a:cxn ang="0">
+                <a:pos x="connsiteX6" y="connsiteY6"/>
+              </a:cxn>
+            </a:cxnLst>
+            <a:rect l="l" t="t" r="r" b="b"/>
+            <a:pathLst>
+              <a:path w="4167271" h="6858000">
+                <a:moveTo>
+                  <a:pt x="0" y="0"/>
+                </a:moveTo>
+                <a:lnTo>
+                  <a:pt x="2259550" y="0"/>
+                </a:lnTo>
+                <a:lnTo>
+                  <a:pt x="2387803" y="82222"/>
+                </a:lnTo>
+                <a:cubicBezTo>
+                  <a:pt x="3461407" y="807534"/>
+                  <a:pt x="4167271" y="2035835"/>
+                  <a:pt x="4167271" y="3429000"/>
+                </a:cubicBezTo>
+                <a:cubicBezTo>
+                  <a:pt x="4167271" y="4822165"/>
+                  <a:pt x="3461407" y="6050467"/>
+                  <a:pt x="2387803" y="6775779"/>
+                </a:cubicBezTo>
+                <a:lnTo>
+                  <a:pt x="2259550" y="6858000"/>
+                </a:lnTo>
+                <a:lnTo>
+                  <a:pt x="0" y="6858000"/>
+                </a:lnTo>
+                <a:close/>
+              </a:path>
+            </a:pathLst>
+          </a:custGeom>
+          <a:solidFill>
+            <a:schemeClr val="accent2"/>
+          </a:solidFill>
+          <a:ln>
+            <a:noFill/>
+          </a:ln>
+        </p:spPr>
+        <p:style>
+          <a:lnRef idx="2">
+            <a:schemeClr val="accent1">
+              <a:shade val="50000"/>
+            </a:schemeClr>
+          </a:lnRef>
+          <a:fillRef idx="1">
+            <a:schemeClr val="accent1"/>
+          </a:fillRef>
+          <a:effectRef idx="0">
+            <a:schemeClr val="accent1"/>
+          </a:effectRef>
+          <a:fontRef idx="minor">
+            <a:schemeClr val="lt1"/>
+          </a:fontRef>
+        </p:style>
+        <p:txBody>
+          <a:bodyPr rtlCol="0" anchor="ctr"/>
+          <a:lstStyle/>
+          <a:p>
+            <a:pPr algn="ctr"/>
+            <a:endParaRPr lang="en-US"/>
+          </a:p>
+        </p:txBody>
+      </p:sp>
+      <p:sp>
+        <p:nvSpPr>
+          <p:cNvPr id="12" name="Arc 11">
+            <a:extLst>
+              <a:ext uri="{FF2B5EF4-FFF2-40B4-BE49-F238E27FC236}">
+                <a16:creationId xmlns:a16="http://schemas.microsoft.com/office/drawing/2014/main" id="{081E4A58-353D-44AE-B2FC-2A74E2E400F7}"/>
+              </a:ext>
+              <a:ext uri="{C183D7F6-B498-43B3-948B-1728B52AA6E4}">
+                <adec:decorative xmlns:adec="http://schemas.microsoft.com/office/drawing/2017/decorative" val="1"/>
+              </a:ext>
+            </a:extLst>
+          </p:cNvPr>
+          <p:cNvSpPr>
+            <a:spLocks noGrp="1" noRot="1" noChangeAspect="1" noMove="1" noResize="1" noEditPoints="1" noAdjustHandles="1" noChangeArrowheads="1" noChangeShapeType="1" noTextEdit="1"/>
+          </p:cNvSpPr>
+          <p:nvPr>
+            <p:extLst>
+              <p:ext uri="{386F3935-93C4-4BCD-93E2-E3B085C9AB24}">
+                <p16:designElem xmlns:p16="http://schemas.microsoft.com/office/powerpoint/2015/main" val="1"/>
+              </p:ext>
+            </p:extLst>
+          </p:nvPr>
+        </p:nvSpPr>
+        <p:spPr>
+          <a:xfrm flipV="1">
+            <a:off x="7550402" y="2455479"/>
+            <a:ext cx="4083433" cy="4083433"/>
+          </a:xfrm>
+          <a:prstGeom prst="arc">
+            <a:avLst/>
+          </a:prstGeom>
+          <a:ln w="127000" cap="rnd">
+            <a:solidFill>
+              <a:schemeClr val="accent4"/>
+            </a:solidFill>
+            <a:prstDash val="dash"/>
+          </a:ln>
+        </p:spPr>
+        <p:style>
+          <a:lnRef idx="1">
+            <a:schemeClr val="accent1"/>
+          </a:lnRef>
+          <a:fillRef idx="0">
+            <a:schemeClr val="accent1"/>
+          </a:fillRef>
+          <a:effectRef idx="0">
+            <a:schemeClr val="accent1"/>
+          </a:effectRef>
+          <a:fontRef idx="minor">
+            <a:schemeClr val="tx1"/>
+          </a:fontRef>
+        </p:style>
+        <p:txBody>
+          <a:bodyPr rtlCol="0" anchor="ctr"/>
+          <a:lstStyle/>
+          <a:p>
+            <a:pPr algn="ctr"/>
+            <a:endParaRPr lang="en-US" dirty="0"/>
+          </a:p>
+        </p:txBody>
+      </p:sp>
+      <p:sp>
+        <p:nvSpPr>
+          <p:cNvPr id="4" name="TextBox 4">
+            <a:extLst>
+              <a:ext uri="{FF2B5EF4-FFF2-40B4-BE49-F238E27FC236}">
+                <a16:creationId xmlns:a16="http://schemas.microsoft.com/office/drawing/2014/main" id="{26AF130D-1424-E2B3-2B55-0800AF5744FB}"/>
+              </a:ext>
+            </a:extLst>
+          </p:cNvPr>
+          <p:cNvSpPr txBox="1"/>
+          <p:nvPr/>
+        </p:nvSpPr>
+        <p:spPr>
+          <a:xfrm>
+            <a:off x="13138" y="2713"/>
+            <a:ext cx="2141725" cy="584775"/>
+          </a:xfrm>
+          <a:prstGeom prst="rect">
+            <a:avLst/>
+          </a:prstGeom>
+          <a:noFill/>
+        </p:spPr>
+        <p:txBody>
+          <a:bodyPr wrap="square">
+            <a:spAutoFit/>
+          </a:bodyPr>
+          <a:lstStyle/>
+          <a:p>
+            <a:pPr algn="ctr"/>
+            <a:r>
+              <a:rPr lang="en-US" sz="3200" b="1" dirty="0">
+                <a:solidFill>
+                  <a:schemeClr val="bg1"/>
+                </a:solidFill>
+                <a:latin typeface="Roboto" panose="02000000000000000000" pitchFamily="2" charset="0"/>
+                <a:ea typeface="Roboto" panose="02000000000000000000" pitchFamily="2" charset="0"/>
+              </a:rPr>
+              <a:t>USE CASE</a:t>
+            </a:r>
+            <a:endParaRPr lang="en-IN" sz="3200" b="1" dirty="0">
+              <a:solidFill>
+                <a:schemeClr val="bg1"/>
+              </a:solidFill>
+              <a:latin typeface="Roboto" panose="02000000000000000000" pitchFamily="2" charset="0"/>
+              <a:ea typeface="Roboto" panose="02000000000000000000" pitchFamily="2" charset="0"/>
+            </a:endParaRPr>
+          </a:p>
+        </p:txBody>
+      </p:sp>
+      <p:sp>
+        <p:nvSpPr>
+          <p:cNvPr id="6" name="Rectangle 5">
+            <a:extLst>
+              <a:ext uri="{FF2B5EF4-FFF2-40B4-BE49-F238E27FC236}">
+                <a16:creationId xmlns:a16="http://schemas.microsoft.com/office/drawing/2014/main" id="{7F721D42-AE12-5747-7F60-C4AC78A5B5CD}"/>
+              </a:ext>
+            </a:extLst>
+          </p:cNvPr>
+          <p:cNvSpPr/>
+          <p:nvPr/>
+        </p:nvSpPr>
+        <p:spPr>
+          <a:xfrm>
+            <a:off x="7381385" y="252261"/>
+            <a:ext cx="3504054" cy="5747533"/>
+          </a:xfrm>
+          <a:prstGeom prst="rect">
+            <a:avLst/>
+          </a:prstGeom>
+          <a:solidFill>
+            <a:schemeClr val="bg1"/>
+          </a:solidFill>
+          <a:ln w="19050">
+            <a:solidFill>
+              <a:schemeClr val="tx1">
+                <a:lumMod val="75000"/>
+                <a:lumOff val="25000"/>
+              </a:schemeClr>
+            </a:solidFill>
+            <a:prstDash val="sysDot"/>
+          </a:ln>
+        </p:spPr>
+        <p:style>
+          <a:lnRef idx="2">
+            <a:schemeClr val="accent1">
+              <a:shade val="50000"/>
+            </a:schemeClr>
+          </a:lnRef>
+          <a:fillRef idx="1">
+            <a:schemeClr val="accent1"/>
+          </a:fillRef>
+          <a:effectRef idx="0">
+            <a:schemeClr val="accent1"/>
+          </a:effectRef>
+          <a:fontRef idx="minor">
+            <a:schemeClr val="lt1"/>
+          </a:fontRef>
+        </p:style>
+        <p:txBody>
+          <a:bodyPr rtlCol="0" anchor="ctr"/>
+          <a:lstStyle/>
+          <a:p>
+            <a:pPr algn="ctr"/>
+            <a:endParaRPr lang="en-IN">
+              <a:latin typeface="Roboto" panose="02000000000000000000" pitchFamily="2" charset="0"/>
+              <a:ea typeface="Roboto" panose="02000000000000000000" pitchFamily="2" charset="0"/>
+            </a:endParaRPr>
+          </a:p>
+        </p:txBody>
+      </p:sp>
+      <p:sp>
+        <p:nvSpPr>
+          <p:cNvPr id="7" name="Oval 6">
+            <a:extLst>
+              <a:ext uri="{FF2B5EF4-FFF2-40B4-BE49-F238E27FC236}">
+                <a16:creationId xmlns:a16="http://schemas.microsoft.com/office/drawing/2014/main" id="{D99A2A8E-21C7-3A79-7B90-791C0233061F}"/>
+              </a:ext>
+            </a:extLst>
+          </p:cNvPr>
+          <p:cNvSpPr/>
+          <p:nvPr/>
+        </p:nvSpPr>
+        <p:spPr>
+          <a:xfrm>
+            <a:off x="7535508" y="1117230"/>
+            <a:ext cx="3144605" cy="724067"/>
+          </a:xfrm>
+          <a:prstGeom prst="ellipse">
+            <a:avLst/>
+          </a:prstGeom>
+          <a:ln>
+            <a:noFill/>
+          </a:ln>
+        </p:spPr>
+        <p:style>
+          <a:lnRef idx="2">
+            <a:schemeClr val="accent1">
+              <a:shade val="50000"/>
+            </a:schemeClr>
+          </a:lnRef>
+          <a:fillRef idx="1">
+            <a:schemeClr val="accent1"/>
+          </a:fillRef>
+          <a:effectRef idx="0">
+            <a:schemeClr val="accent1"/>
+          </a:effectRef>
+          <a:fontRef idx="minor">
+            <a:schemeClr val="lt1"/>
+          </a:fontRef>
+        </p:style>
+        <p:txBody>
+          <a:bodyPr rtlCol="0" anchor="ctr"/>
+          <a:lstStyle/>
+          <a:p>
+            <a:pPr algn="ctr"/>
+            <a:r>
+              <a:rPr lang="en-IN" sz="1400" dirty="0">
+                <a:solidFill>
+                  <a:schemeClr val="tx1"/>
+                </a:solidFill>
+                <a:latin typeface="Roboto" panose="02000000000000000000" pitchFamily="2" charset="0"/>
+                <a:ea typeface="Roboto" panose="02000000000000000000" pitchFamily="2" charset="0"/>
+              </a:rPr>
+              <a:t>Recap To-Do List</a:t>
+            </a:r>
+          </a:p>
+        </p:txBody>
+      </p:sp>
+      <p:sp>
+        <p:nvSpPr>
+          <p:cNvPr id="9" name="Oval 7">
+            <a:extLst>
+              <a:ext uri="{FF2B5EF4-FFF2-40B4-BE49-F238E27FC236}">
+                <a16:creationId xmlns:a16="http://schemas.microsoft.com/office/drawing/2014/main" id="{D13CE6D5-0D15-A640-F102-5B658C392C2E}"/>
+              </a:ext>
+            </a:extLst>
+          </p:cNvPr>
+          <p:cNvSpPr/>
+          <p:nvPr/>
+        </p:nvSpPr>
+        <p:spPr>
+          <a:xfrm>
+            <a:off x="7554912" y="2011972"/>
+            <a:ext cx="3144605" cy="722766"/>
+          </a:xfrm>
+          <a:prstGeom prst="ellipse">
+            <a:avLst/>
+          </a:prstGeom>
+          <a:solidFill>
+            <a:schemeClr val="accent2">
+              <a:lumMod val="60000"/>
+              <a:lumOff val="40000"/>
+            </a:schemeClr>
+          </a:solidFill>
+          <a:ln>
+            <a:noFill/>
+          </a:ln>
+        </p:spPr>
+        <p:style>
+          <a:lnRef idx="2">
+            <a:schemeClr val="accent1">
+              <a:shade val="50000"/>
+            </a:schemeClr>
+          </a:lnRef>
+          <a:fillRef idx="1">
+            <a:schemeClr val="accent1"/>
+          </a:fillRef>
+          <a:effectRef idx="0">
+            <a:schemeClr val="accent1"/>
+          </a:effectRef>
+          <a:fontRef idx="minor">
+            <a:schemeClr val="lt1"/>
+          </a:fontRef>
+        </p:style>
+        <p:txBody>
+          <a:bodyPr rtlCol="0" anchor="ctr"/>
+          <a:lstStyle/>
+          <a:p>
+            <a:pPr algn="ctr"/>
+            <a:r>
+              <a:rPr lang="en-US" sz="1400" dirty="0" err="1">
+                <a:solidFill>
+                  <a:schemeClr val="tx1"/>
+                </a:solidFill>
+                <a:latin typeface="Roboto" panose="02000000000000000000" pitchFamily="2" charset="0"/>
+                <a:ea typeface="Roboto" panose="02000000000000000000" pitchFamily="2" charset="0"/>
+              </a:rPr>
+              <a:t>Ajout</a:t>
+            </a:r>
+            <a:r>
+              <a:rPr lang="en-US" sz="1400" dirty="0">
+                <a:solidFill>
+                  <a:schemeClr val="tx1"/>
+                </a:solidFill>
+                <a:latin typeface="Roboto" panose="02000000000000000000" pitchFamily="2" charset="0"/>
+                <a:ea typeface="Roboto" panose="02000000000000000000" pitchFamily="2" charset="0"/>
+              </a:rPr>
+              <a:t> </a:t>
+            </a:r>
+            <a:r>
+              <a:rPr lang="en-US" sz="1400" dirty="0" err="1">
+                <a:solidFill>
+                  <a:schemeClr val="tx1"/>
+                </a:solidFill>
+                <a:latin typeface="Roboto" panose="02000000000000000000" pitchFamily="2" charset="0"/>
+                <a:ea typeface="Roboto" panose="02000000000000000000" pitchFamily="2" charset="0"/>
+              </a:rPr>
+              <a:t>d’une</a:t>
+            </a:r>
+            <a:r>
+              <a:rPr lang="en-US" sz="1400" dirty="0">
+                <a:solidFill>
+                  <a:schemeClr val="tx1"/>
+                </a:solidFill>
+                <a:latin typeface="Roboto" panose="02000000000000000000" pitchFamily="2" charset="0"/>
+                <a:ea typeface="Roboto" panose="02000000000000000000" pitchFamily="2" charset="0"/>
+              </a:rPr>
+              <a:t> nouvelle </a:t>
+            </a:r>
+            <a:r>
+              <a:rPr lang="en-US" sz="1400" dirty="0" err="1">
+                <a:solidFill>
+                  <a:schemeClr val="tx1"/>
+                </a:solidFill>
+                <a:latin typeface="Roboto" panose="02000000000000000000" pitchFamily="2" charset="0"/>
+                <a:ea typeface="Roboto" panose="02000000000000000000" pitchFamily="2" charset="0"/>
+              </a:rPr>
+              <a:t>tâche</a:t>
+            </a:r>
+            <a:r>
+              <a:rPr lang="en-US" sz="1400" dirty="0">
+                <a:solidFill>
+                  <a:schemeClr val="tx1"/>
+                </a:solidFill>
+                <a:latin typeface="Roboto" panose="02000000000000000000" pitchFamily="2" charset="0"/>
+                <a:ea typeface="Roboto" panose="02000000000000000000" pitchFamily="2" charset="0"/>
+              </a:rPr>
+              <a:t> sur son </a:t>
+            </a:r>
+            <a:r>
+              <a:rPr lang="en-US" sz="1400" dirty="0" err="1">
+                <a:solidFill>
+                  <a:schemeClr val="tx1"/>
+                </a:solidFill>
+                <a:latin typeface="Roboto" panose="02000000000000000000" pitchFamily="2" charset="0"/>
+                <a:ea typeface="Roboto" panose="02000000000000000000" pitchFamily="2" charset="0"/>
+              </a:rPr>
+              <a:t>compte</a:t>
+            </a:r>
+            <a:endParaRPr lang="en-IN" sz="1400" dirty="0">
+              <a:solidFill>
+                <a:schemeClr val="tx1"/>
+              </a:solidFill>
+              <a:latin typeface="Roboto" panose="02000000000000000000" pitchFamily="2" charset="0"/>
+              <a:ea typeface="Roboto" panose="02000000000000000000" pitchFamily="2" charset="0"/>
+            </a:endParaRPr>
+          </a:p>
+        </p:txBody>
+      </p:sp>
+      <p:sp>
+        <p:nvSpPr>
+          <p:cNvPr id="13" name="TextBox 17">
+            <a:extLst>
+              <a:ext uri="{FF2B5EF4-FFF2-40B4-BE49-F238E27FC236}">
+                <a16:creationId xmlns:a16="http://schemas.microsoft.com/office/drawing/2014/main" id="{CC472F76-1D9B-9D91-7122-2A2944F3E355}"/>
+              </a:ext>
+            </a:extLst>
+          </p:cNvPr>
+          <p:cNvSpPr txBox="1"/>
+          <p:nvPr/>
+        </p:nvSpPr>
+        <p:spPr>
+          <a:xfrm>
+            <a:off x="8023165" y="454764"/>
+            <a:ext cx="2245782" cy="369332"/>
+          </a:xfrm>
+          <a:prstGeom prst="rect">
+            <a:avLst/>
+          </a:prstGeom>
+          <a:noFill/>
+        </p:spPr>
+        <p:txBody>
+          <a:bodyPr wrap="square" rtlCol="0">
+            <a:spAutoFit/>
+          </a:bodyPr>
+          <a:lstStyle/>
+          <a:p>
+            <a:pPr algn="ctr"/>
+            <a:r>
+              <a:rPr lang="en-US" b="1" dirty="0">
+                <a:latin typeface="Roboto" panose="02000000000000000000" pitchFamily="2" charset="0"/>
+                <a:ea typeface="Roboto" panose="02000000000000000000" pitchFamily="2" charset="0"/>
+              </a:rPr>
+              <a:t>To-do List</a:t>
+            </a:r>
+            <a:endParaRPr lang="en-IN" b="1" dirty="0">
+              <a:latin typeface="Roboto" panose="02000000000000000000" pitchFamily="2" charset="0"/>
+              <a:ea typeface="Roboto" panose="02000000000000000000" pitchFamily="2" charset="0"/>
+            </a:endParaRPr>
+          </a:p>
+        </p:txBody>
+      </p:sp>
+      <p:cxnSp>
+        <p:nvCxnSpPr>
+          <p:cNvPr id="14" name="Straight Connector 21">
+            <a:extLst>
+              <a:ext uri="{FF2B5EF4-FFF2-40B4-BE49-F238E27FC236}">
+                <a16:creationId xmlns:a16="http://schemas.microsoft.com/office/drawing/2014/main" id="{873CFDEF-9B9D-F871-48B5-CE070331AE37}"/>
+              </a:ext>
+            </a:extLst>
+          </p:cNvPr>
+          <p:cNvCxnSpPr>
+            <a:cxnSpLocks/>
+            <a:stCxn id="38" idx="3"/>
+            <a:endCxn id="7" idx="2"/>
+          </p:cNvCxnSpPr>
+          <p:nvPr/>
+        </p:nvCxnSpPr>
+        <p:spPr>
+          <a:xfrm flipV="1">
+            <a:off x="6403983" y="1479264"/>
+            <a:ext cx="1131525" cy="1603897"/>
+          </a:xfrm>
+          <a:prstGeom prst="line">
+            <a:avLst/>
+          </a:prstGeom>
+          <a:ln w="19050">
+            <a:solidFill>
+              <a:schemeClr val="bg1">
+                <a:lumMod val="50000"/>
+              </a:schemeClr>
+            </a:solidFill>
+            <a:prstDash val="sysDot"/>
+          </a:ln>
+        </p:spPr>
+        <p:style>
+          <a:lnRef idx="1">
+            <a:schemeClr val="accent1"/>
+          </a:lnRef>
+          <a:fillRef idx="0">
+            <a:schemeClr val="accent1"/>
+          </a:fillRef>
+          <a:effectRef idx="0">
+            <a:schemeClr val="accent1"/>
+          </a:effectRef>
+          <a:fontRef idx="minor">
+            <a:schemeClr val="tx1"/>
+          </a:fontRef>
+        </p:style>
+      </p:cxnSp>
+      <p:cxnSp>
+        <p:nvCxnSpPr>
+          <p:cNvPr id="16" name="Straight Connector 24">
+            <a:extLst>
+              <a:ext uri="{FF2B5EF4-FFF2-40B4-BE49-F238E27FC236}">
+                <a16:creationId xmlns:a16="http://schemas.microsoft.com/office/drawing/2014/main" id="{14ABDBD0-4AF6-7B5F-8DF5-E2262B754D40}"/>
+              </a:ext>
+            </a:extLst>
+          </p:cNvPr>
+          <p:cNvCxnSpPr>
+            <a:cxnSpLocks/>
+            <a:stCxn id="38" idx="3"/>
+            <a:endCxn id="9" idx="2"/>
+          </p:cNvCxnSpPr>
+          <p:nvPr/>
+        </p:nvCxnSpPr>
+        <p:spPr>
+          <a:xfrm flipV="1">
+            <a:off x="6403983" y="2373355"/>
+            <a:ext cx="1150929" cy="709806"/>
+          </a:xfrm>
+          <a:prstGeom prst="line">
+            <a:avLst/>
+          </a:prstGeom>
+          <a:ln w="19050">
+            <a:solidFill>
+              <a:schemeClr val="bg1">
+                <a:lumMod val="50000"/>
+              </a:schemeClr>
+            </a:solidFill>
+            <a:prstDash val="sysDot"/>
+          </a:ln>
+        </p:spPr>
+        <p:style>
+          <a:lnRef idx="1">
+            <a:schemeClr val="accent1"/>
+          </a:lnRef>
+          <a:fillRef idx="0">
+            <a:schemeClr val="accent1"/>
+          </a:fillRef>
+          <a:effectRef idx="0">
+            <a:schemeClr val="accent1"/>
+          </a:effectRef>
+          <a:fontRef idx="minor">
+            <a:schemeClr val="tx1"/>
+          </a:fontRef>
+        </p:style>
+      </p:cxnSp>
+      <p:grpSp>
+        <p:nvGrpSpPr>
+          <p:cNvPr id="2" name="Groupe 1">
+            <a:extLst>
+              <a:ext uri="{FF2B5EF4-FFF2-40B4-BE49-F238E27FC236}">
+                <a16:creationId xmlns:a16="http://schemas.microsoft.com/office/drawing/2014/main" id="{B00F8EF2-D58C-F60C-CC3D-DEC18F799328}"/>
+              </a:ext>
+            </a:extLst>
+          </p:cNvPr>
+          <p:cNvGrpSpPr/>
+          <p:nvPr/>
+        </p:nvGrpSpPr>
+        <p:grpSpPr>
+          <a:xfrm>
+            <a:off x="5004164" y="2383251"/>
+            <a:ext cx="1399819" cy="1710799"/>
+            <a:chOff x="3939863" y="2455479"/>
+            <a:chExt cx="1399819" cy="1710799"/>
+          </a:xfrm>
+        </p:grpSpPr>
+        <p:sp>
+          <p:nvSpPr>
+            <p:cNvPr id="29" name="TextBox 46">
+              <a:extLst>
+                <a:ext uri="{FF2B5EF4-FFF2-40B4-BE49-F238E27FC236}">
+                  <a16:creationId xmlns:a16="http://schemas.microsoft.com/office/drawing/2014/main" id="{414C48B4-FC1C-75C7-3FF9-8FB43BBDE901}"/>
+                </a:ext>
+              </a:extLst>
+            </p:cNvPr>
+            <p:cNvSpPr txBox="1"/>
+            <p:nvPr/>
+          </p:nvSpPr>
+          <p:spPr>
+            <a:xfrm>
+              <a:off x="4128605" y="3796946"/>
+              <a:ext cx="1015079" cy="369332"/>
+            </a:xfrm>
+            <a:prstGeom prst="rect">
+              <a:avLst/>
+            </a:prstGeom>
+            <a:noFill/>
+          </p:spPr>
+          <p:txBody>
+            <a:bodyPr wrap="square" rtlCol="0">
+              <a:spAutoFit/>
+            </a:bodyPr>
+            <a:lstStyle/>
+            <a:p>
+              <a:pPr algn="ctr"/>
+              <a:r>
+                <a:rPr lang="en-US" b="1" dirty="0">
+                  <a:latin typeface="Roboto" panose="02000000000000000000" pitchFamily="2" charset="0"/>
+                  <a:ea typeface="Roboto" panose="02000000000000000000" pitchFamily="2" charset="0"/>
+                </a:rPr>
+                <a:t>User</a:t>
+              </a:r>
+            </a:p>
+          </p:txBody>
+        </p:sp>
+        <p:pic>
+          <p:nvPicPr>
+            <p:cNvPr id="38" name="Graphique 37" descr="Homme avec un remplissage uni">
+              <a:extLst>
+                <a:ext uri="{FF2B5EF4-FFF2-40B4-BE49-F238E27FC236}">
+                  <a16:creationId xmlns:a16="http://schemas.microsoft.com/office/drawing/2014/main" id="{E7C16AF1-F776-C1E9-289A-B8EF397BE3C5}"/>
+                </a:ext>
+              </a:extLst>
+            </p:cNvPr>
+            <p:cNvPicPr>
+              <a:picLocks noChangeAspect="1"/>
+            </p:cNvPicPr>
+            <p:nvPr/>
+          </p:nvPicPr>
+          <p:blipFill>
+            <a:blip r:embed="rId2">
+              <a:extLst>
+                <a:ext uri="{28A0092B-C50C-407E-A947-70E740481C1C}">
+                  <a14:useLocalDpi xmlns:a14="http://schemas.microsoft.com/office/drawing/2010/main" val="0"/>
+                </a:ext>
+                <a:ext uri="{96DAC541-7B7A-43D3-8B79-37D633B846F1}">
+                  <asvg:svgBlip xmlns:asvg="http://schemas.microsoft.com/office/drawing/2016/SVG/main" r:embed="rId3"/>
+                </a:ext>
+              </a:extLst>
+            </a:blip>
+            <a:stretch>
+              <a:fillRect/>
+            </a:stretch>
+          </p:blipFill>
+          <p:spPr>
+            <a:xfrm>
+              <a:off x="3939863" y="2455479"/>
+              <a:ext cx="1399819" cy="1399819"/>
+            </a:xfrm>
+            <a:prstGeom prst="rect">
+              <a:avLst/>
+            </a:prstGeom>
+          </p:spPr>
+        </p:pic>
+      </p:grpSp>
+      <p:grpSp>
+        <p:nvGrpSpPr>
+          <p:cNvPr id="3" name="Groupe 2">
+            <a:extLst>
+              <a:ext uri="{FF2B5EF4-FFF2-40B4-BE49-F238E27FC236}">
+                <a16:creationId xmlns:a16="http://schemas.microsoft.com/office/drawing/2014/main" id="{2E2A0CEC-FBB6-27EE-6E85-C6148A211956}"/>
+              </a:ext>
+            </a:extLst>
+          </p:cNvPr>
+          <p:cNvGrpSpPr/>
+          <p:nvPr/>
+        </p:nvGrpSpPr>
+        <p:grpSpPr>
+          <a:xfrm>
+            <a:off x="3470417" y="4599975"/>
+            <a:ext cx="1399819" cy="2046150"/>
+            <a:chOff x="10709778" y="2455479"/>
+            <a:chExt cx="1399819" cy="2046150"/>
+          </a:xfrm>
+        </p:grpSpPr>
+        <p:sp>
+          <p:nvSpPr>
+            <p:cNvPr id="30" name="TextBox 47">
+              <a:extLst>
+                <a:ext uri="{FF2B5EF4-FFF2-40B4-BE49-F238E27FC236}">
+                  <a16:creationId xmlns:a16="http://schemas.microsoft.com/office/drawing/2014/main" id="{9DA04B99-AC68-12A1-6DD2-B3BB4072F947}"/>
+                </a:ext>
+              </a:extLst>
+            </p:cNvPr>
+            <p:cNvSpPr txBox="1"/>
+            <p:nvPr/>
+          </p:nvSpPr>
+          <p:spPr>
+            <a:xfrm>
+              <a:off x="10726639" y="3855298"/>
+              <a:ext cx="1361348" cy="646331"/>
+            </a:xfrm>
+            <a:prstGeom prst="rect">
+              <a:avLst/>
+            </a:prstGeom>
+            <a:noFill/>
+          </p:spPr>
+          <p:txBody>
+            <a:bodyPr wrap="square" rtlCol="0">
+              <a:spAutoFit/>
+            </a:bodyPr>
+            <a:lstStyle/>
+            <a:p>
+              <a:pPr algn="ctr"/>
+              <a:r>
+                <a:rPr lang="en-US" b="1" dirty="0">
+                  <a:latin typeface="Roboto" panose="02000000000000000000" pitchFamily="2" charset="0"/>
+                  <a:ea typeface="Roboto" panose="02000000000000000000" pitchFamily="2" charset="0"/>
+                </a:rPr>
+                <a:t>User ”</a:t>
+              </a:r>
+              <a:r>
+                <a:rPr lang="en-US" b="1" dirty="0" err="1">
+                  <a:latin typeface="Roboto" panose="02000000000000000000" pitchFamily="2" charset="0"/>
+                  <a:ea typeface="Roboto" panose="02000000000000000000" pitchFamily="2" charset="0"/>
+                </a:rPr>
+                <a:t>Bénévole</a:t>
+              </a:r>
+              <a:r>
+                <a:rPr lang="en-US" b="1" dirty="0">
+                  <a:latin typeface="Roboto" panose="02000000000000000000" pitchFamily="2" charset="0"/>
+                  <a:ea typeface="Roboto" panose="02000000000000000000" pitchFamily="2" charset="0"/>
+                </a:rPr>
+                <a:t>”</a:t>
+              </a:r>
+              <a:endParaRPr lang="en-IN" b="1" dirty="0">
+                <a:latin typeface="Roboto" panose="02000000000000000000" pitchFamily="2" charset="0"/>
+                <a:ea typeface="Roboto" panose="02000000000000000000" pitchFamily="2" charset="0"/>
+              </a:endParaRPr>
+            </a:p>
+          </p:txBody>
+        </p:sp>
+        <p:pic>
+          <p:nvPicPr>
+            <p:cNvPr id="45" name="Graphique 44" descr="Homme avec un remplissage uni">
+              <a:extLst>
+                <a:ext uri="{FF2B5EF4-FFF2-40B4-BE49-F238E27FC236}">
+                  <a16:creationId xmlns:a16="http://schemas.microsoft.com/office/drawing/2014/main" id="{BB5AAFA2-F83B-2FA5-8CA8-AB93BE7E779E}"/>
+                </a:ext>
+              </a:extLst>
+            </p:cNvPr>
+            <p:cNvPicPr>
+              <a:picLocks noChangeAspect="1"/>
+            </p:cNvPicPr>
+            <p:nvPr/>
+          </p:nvPicPr>
+          <p:blipFill>
+            <a:blip r:embed="rId2">
+              <a:extLst>
+                <a:ext uri="{28A0092B-C50C-407E-A947-70E740481C1C}">
+                  <a14:useLocalDpi xmlns:a14="http://schemas.microsoft.com/office/drawing/2010/main" val="0"/>
+                </a:ext>
+                <a:ext uri="{96DAC541-7B7A-43D3-8B79-37D633B846F1}">
+                  <asvg:svgBlip xmlns:asvg="http://schemas.microsoft.com/office/drawing/2016/SVG/main" r:embed="rId3"/>
+                </a:ext>
+              </a:extLst>
+            </a:blip>
+            <a:stretch>
+              <a:fillRect/>
+            </a:stretch>
+          </p:blipFill>
+          <p:spPr>
+            <a:xfrm>
+              <a:off x="10709778" y="2455479"/>
+              <a:ext cx="1399819" cy="1399819"/>
+            </a:xfrm>
+            <a:prstGeom prst="rect">
+              <a:avLst/>
+            </a:prstGeom>
+          </p:spPr>
+        </p:pic>
+      </p:grpSp>
+      <p:pic>
+        <p:nvPicPr>
+          <p:cNvPr id="80" name="Image 79" descr="Une image contenant Graphique, logo, clipart, conception&#10;&#10;Description générée automatiquement">
+            <a:extLst>
+              <a:ext uri="{FF2B5EF4-FFF2-40B4-BE49-F238E27FC236}">
+                <a16:creationId xmlns:a16="http://schemas.microsoft.com/office/drawing/2014/main" id="{F58924B8-02CB-382D-5A43-544056A851D6}"/>
+              </a:ext>
+            </a:extLst>
+          </p:cNvPr>
+          <p:cNvPicPr>
+            <a:picLocks noChangeAspect="1"/>
+          </p:cNvPicPr>
+          <p:nvPr/>
+        </p:nvPicPr>
+        <p:blipFill>
+          <a:blip r:embed="rId4">
+            <a:extLst>
+              <a:ext uri="{28A0092B-C50C-407E-A947-70E740481C1C}">
+                <a14:useLocalDpi xmlns:a14="http://schemas.microsoft.com/office/drawing/2010/main" val="0"/>
+              </a:ext>
+            </a:extLst>
+          </a:blip>
+          <a:stretch>
+            <a:fillRect/>
+          </a:stretch>
+        </p:blipFill>
+        <p:spPr>
+          <a:xfrm>
+            <a:off x="11026862" y="-1"/>
+            <a:ext cx="1152000" cy="576000"/>
+          </a:xfrm>
+          <a:prstGeom prst="rect">
+            <a:avLst/>
+          </a:prstGeom>
+        </p:spPr>
+      </p:pic>
+      <p:pic>
+        <p:nvPicPr>
+          <p:cNvPr id="81" name="Image 80" descr="Une image contenant Police, logo, Graphique, texte&#10;&#10;Description générée automatiquement">
+            <a:extLst>
+              <a:ext uri="{FF2B5EF4-FFF2-40B4-BE49-F238E27FC236}">
+                <a16:creationId xmlns:a16="http://schemas.microsoft.com/office/drawing/2014/main" id="{4ADA3436-E660-0289-04BC-D4F02FD03E45}"/>
+              </a:ext>
+            </a:extLst>
+          </p:cNvPr>
+          <p:cNvPicPr>
+            <a:picLocks noChangeAspect="1"/>
+          </p:cNvPicPr>
+          <p:nvPr/>
+        </p:nvPicPr>
+        <p:blipFill>
+          <a:blip r:embed="rId5">
+            <a:extLst>
+              <a:ext uri="{28A0092B-C50C-407E-A947-70E740481C1C}">
+                <a14:useLocalDpi xmlns:a14="http://schemas.microsoft.com/office/drawing/2010/main" val="0"/>
+              </a:ext>
+            </a:extLst>
+          </a:blip>
+          <a:stretch>
+            <a:fillRect/>
+          </a:stretch>
+        </p:blipFill>
+        <p:spPr>
+          <a:xfrm>
+            <a:off x="10902447" y="6250912"/>
+            <a:ext cx="1289553" cy="576000"/>
+          </a:xfrm>
+          <a:prstGeom prst="rect">
+            <a:avLst/>
+          </a:prstGeom>
+        </p:spPr>
+      </p:pic>
+      <p:grpSp>
+        <p:nvGrpSpPr>
+          <p:cNvPr id="28" name="Groupe 27">
+            <a:extLst>
+              <a:ext uri="{FF2B5EF4-FFF2-40B4-BE49-F238E27FC236}">
+                <a16:creationId xmlns:a16="http://schemas.microsoft.com/office/drawing/2014/main" id="{8854F419-D83E-1D47-49BE-72551C4E9E04}"/>
+              </a:ext>
+            </a:extLst>
+          </p:cNvPr>
+          <p:cNvGrpSpPr/>
+          <p:nvPr/>
+        </p:nvGrpSpPr>
+        <p:grpSpPr>
+          <a:xfrm>
+            <a:off x="3511546" y="86432"/>
+            <a:ext cx="1399819" cy="1987798"/>
+            <a:chOff x="3939863" y="2455479"/>
+            <a:chExt cx="1399819" cy="1987798"/>
+          </a:xfrm>
+        </p:grpSpPr>
+        <p:sp>
+          <p:nvSpPr>
+            <p:cNvPr id="31" name="TextBox 46">
+              <a:extLst>
+                <a:ext uri="{FF2B5EF4-FFF2-40B4-BE49-F238E27FC236}">
+                  <a16:creationId xmlns:a16="http://schemas.microsoft.com/office/drawing/2014/main" id="{9250C9C6-A136-B355-650D-D5D09971302B}"/>
+                </a:ext>
+              </a:extLst>
+            </p:cNvPr>
+            <p:cNvSpPr txBox="1"/>
+            <p:nvPr/>
+          </p:nvSpPr>
+          <p:spPr>
+            <a:xfrm>
+              <a:off x="4128605" y="3796946"/>
+              <a:ext cx="1015079" cy="646331"/>
+            </a:xfrm>
+            <a:prstGeom prst="rect">
+              <a:avLst/>
+            </a:prstGeom>
+            <a:noFill/>
+          </p:spPr>
+          <p:txBody>
+            <a:bodyPr wrap="square" rtlCol="0">
+              <a:spAutoFit/>
+            </a:bodyPr>
+            <a:lstStyle/>
+            <a:p>
+              <a:pPr algn="ctr"/>
+              <a:r>
+                <a:rPr lang="en-US" b="1" dirty="0">
+                  <a:latin typeface="Roboto" panose="02000000000000000000" pitchFamily="2" charset="0"/>
+                  <a:ea typeface="Roboto" panose="02000000000000000000" pitchFamily="2" charset="0"/>
+                </a:rPr>
+                <a:t>User</a:t>
+              </a:r>
+            </a:p>
+            <a:p>
+              <a:pPr algn="ctr"/>
+              <a:r>
+                <a:rPr lang="en-US" b="1" dirty="0">
+                  <a:latin typeface="Roboto" panose="02000000000000000000" pitchFamily="2" charset="0"/>
+                  <a:ea typeface="Roboto" panose="02000000000000000000" pitchFamily="2" charset="0"/>
+                </a:rPr>
+                <a:t>”</a:t>
+              </a:r>
+              <a:r>
+                <a:rPr lang="en-US" b="1" dirty="0" err="1">
+                  <a:latin typeface="Roboto" panose="02000000000000000000" pitchFamily="2" charset="0"/>
+                  <a:ea typeface="Roboto" panose="02000000000000000000" pitchFamily="2" charset="0"/>
+                </a:rPr>
+                <a:t>Elève</a:t>
+              </a:r>
+              <a:r>
+                <a:rPr lang="en-US" b="1" dirty="0">
+                  <a:latin typeface="Roboto" panose="02000000000000000000" pitchFamily="2" charset="0"/>
+                  <a:ea typeface="Roboto" panose="02000000000000000000" pitchFamily="2" charset="0"/>
+                </a:rPr>
+                <a:t>”</a:t>
+              </a:r>
+              <a:endParaRPr lang="en-IN" b="1" dirty="0">
+                <a:latin typeface="Roboto" panose="02000000000000000000" pitchFamily="2" charset="0"/>
+                <a:ea typeface="Roboto" panose="02000000000000000000" pitchFamily="2" charset="0"/>
+              </a:endParaRPr>
+            </a:p>
+          </p:txBody>
+        </p:sp>
+        <p:pic>
+          <p:nvPicPr>
+            <p:cNvPr id="32" name="Graphique 31" descr="Homme avec un remplissage uni">
+              <a:extLst>
+                <a:ext uri="{FF2B5EF4-FFF2-40B4-BE49-F238E27FC236}">
+                  <a16:creationId xmlns:a16="http://schemas.microsoft.com/office/drawing/2014/main" id="{213E5F17-FE3B-0BF3-62E9-3A76D415608A}"/>
+                </a:ext>
+              </a:extLst>
+            </p:cNvPr>
+            <p:cNvPicPr>
+              <a:picLocks noChangeAspect="1"/>
+            </p:cNvPicPr>
+            <p:nvPr/>
+          </p:nvPicPr>
+          <p:blipFill>
+            <a:blip r:embed="rId2">
+              <a:extLst>
+                <a:ext uri="{28A0092B-C50C-407E-A947-70E740481C1C}">
+                  <a14:useLocalDpi xmlns:a14="http://schemas.microsoft.com/office/drawing/2010/main" val="0"/>
+                </a:ext>
+                <a:ext uri="{96DAC541-7B7A-43D3-8B79-37D633B846F1}">
+                  <asvg:svgBlip xmlns:asvg="http://schemas.microsoft.com/office/drawing/2016/SVG/main" r:embed="rId3"/>
+                </a:ext>
+              </a:extLst>
+            </a:blip>
+            <a:stretch>
+              <a:fillRect/>
+            </a:stretch>
+          </p:blipFill>
+          <p:spPr>
+            <a:xfrm>
+              <a:off x="3939863" y="2455479"/>
+              <a:ext cx="1399819" cy="1399819"/>
+            </a:xfrm>
+            <a:prstGeom prst="rect">
+              <a:avLst/>
+            </a:prstGeom>
+          </p:spPr>
+        </p:pic>
+      </p:grpSp>
+      <p:cxnSp>
+        <p:nvCxnSpPr>
+          <p:cNvPr id="75" name="Connecteur droit avec flèche 74">
+            <a:extLst>
+              <a:ext uri="{FF2B5EF4-FFF2-40B4-BE49-F238E27FC236}">
+                <a16:creationId xmlns:a16="http://schemas.microsoft.com/office/drawing/2014/main" id="{1B12061A-C563-C252-9EF4-C7B1E836A550}"/>
+              </a:ext>
+            </a:extLst>
+          </p:cNvPr>
+          <p:cNvCxnSpPr>
+            <a:cxnSpLocks/>
+            <a:stCxn id="31" idx="3"/>
+          </p:cNvCxnSpPr>
+          <p:nvPr/>
+        </p:nvCxnSpPr>
+        <p:spPr>
+          <a:xfrm>
+            <a:off x="4715367" y="1751065"/>
+            <a:ext cx="563737" cy="878462"/>
+          </a:xfrm>
+          <a:prstGeom prst="straightConnector1">
+            <a:avLst/>
+          </a:prstGeom>
+          <a:ln w="38100">
+            <a:solidFill>
+              <a:schemeClr val="tx1"/>
+            </a:solidFill>
+            <a:tailEnd type="arrow"/>
+          </a:ln>
+        </p:spPr>
+        <p:style>
+          <a:lnRef idx="1">
+            <a:schemeClr val="accent1"/>
+          </a:lnRef>
+          <a:fillRef idx="0">
+            <a:schemeClr val="accent1"/>
+          </a:fillRef>
+          <a:effectRef idx="0">
+            <a:schemeClr val="accent1"/>
+          </a:effectRef>
+          <a:fontRef idx="minor">
+            <a:schemeClr val="tx1"/>
+          </a:fontRef>
+        </p:style>
+      </p:cxnSp>
+      <p:cxnSp>
+        <p:nvCxnSpPr>
+          <p:cNvPr id="84" name="Connecteur droit avec flèche 83">
+            <a:extLst>
+              <a:ext uri="{FF2B5EF4-FFF2-40B4-BE49-F238E27FC236}">
+                <a16:creationId xmlns:a16="http://schemas.microsoft.com/office/drawing/2014/main" id="{926732A8-A955-7940-EE1B-BD4CB598647F}"/>
+              </a:ext>
+            </a:extLst>
+          </p:cNvPr>
+          <p:cNvCxnSpPr>
+            <a:cxnSpLocks/>
+            <a:endCxn id="29" idx="1"/>
+          </p:cNvCxnSpPr>
+          <p:nvPr/>
+        </p:nvCxnSpPr>
+        <p:spPr>
+          <a:xfrm flipV="1">
+            <a:off x="4363270" y="3909384"/>
+            <a:ext cx="829636" cy="827431"/>
+          </a:xfrm>
+          <a:prstGeom prst="straightConnector1">
+            <a:avLst/>
+          </a:prstGeom>
+          <a:ln w="38100">
+            <a:solidFill>
+              <a:schemeClr val="tx1"/>
+            </a:solidFill>
+            <a:tailEnd type="arrow"/>
+          </a:ln>
+        </p:spPr>
+        <p:style>
+          <a:lnRef idx="1">
+            <a:schemeClr val="accent1"/>
+          </a:lnRef>
+          <a:fillRef idx="0">
+            <a:schemeClr val="accent1"/>
+          </a:fillRef>
+          <a:effectRef idx="0">
+            <a:schemeClr val="accent1"/>
+          </a:effectRef>
+          <a:fontRef idx="minor">
+            <a:schemeClr val="tx1"/>
+          </a:fontRef>
+        </p:style>
+      </p:cxnSp>
+      <p:sp>
+        <p:nvSpPr>
+          <p:cNvPr id="98" name="ZoneTexte 97">
+            <a:extLst>
+              <a:ext uri="{FF2B5EF4-FFF2-40B4-BE49-F238E27FC236}">
+                <a16:creationId xmlns:a16="http://schemas.microsoft.com/office/drawing/2014/main" id="{41E28D29-7A9A-0FB8-9205-1B64A91FE6E0}"/>
+              </a:ext>
+            </a:extLst>
+          </p:cNvPr>
+          <p:cNvSpPr txBox="1"/>
+          <p:nvPr/>
+        </p:nvSpPr>
+        <p:spPr>
+          <a:xfrm>
+            <a:off x="20354" y="4599975"/>
+            <a:ext cx="3491192" cy="1169551"/>
+          </a:xfrm>
+          <a:prstGeom prst="rect">
+            <a:avLst/>
+          </a:prstGeom>
+          <a:noFill/>
+        </p:spPr>
+        <p:txBody>
+          <a:bodyPr wrap="square" rtlCol="0">
+            <a:spAutoFit/>
+          </a:bodyPr>
+          <a:lstStyle/>
+          <a:p>
+            <a:r>
+              <a:rPr lang="fr-FR" sz="1000" dirty="0">
+                <a:solidFill>
+                  <a:schemeClr val="bg1"/>
+                </a:solidFill>
+              </a:rPr>
+              <a:t>Page To-Do List:</a:t>
+            </a:r>
+          </a:p>
+          <a:p>
+            <a:pPr marL="285750" indent="-285750">
+              <a:buFontTx/>
+              <a:buChar char="-"/>
+            </a:pPr>
+            <a:r>
+              <a:rPr lang="fr-FR" sz="1000" dirty="0">
+                <a:solidFill>
+                  <a:schemeClr val="bg1"/>
+                </a:solidFill>
+              </a:rPr>
+              <a:t>Affichage des tâches</a:t>
+            </a:r>
+          </a:p>
+          <a:p>
+            <a:pPr marL="285750" indent="-285750">
+              <a:buFontTx/>
+              <a:buChar char="-"/>
+            </a:pPr>
+            <a:r>
+              <a:rPr lang="fr-FR" sz="1000" dirty="0">
+                <a:solidFill>
+                  <a:schemeClr val="bg1"/>
+                </a:solidFill>
+              </a:rPr>
+              <a:t>Affichage d’une tâches sur son compte (élève et Bénévole)</a:t>
+            </a:r>
+          </a:p>
+          <a:p>
+            <a:pPr marL="285750" indent="-285750">
+              <a:buFontTx/>
+              <a:buChar char="-"/>
+            </a:pPr>
+            <a:r>
+              <a:rPr lang="fr-FR" sz="1000" dirty="0">
+                <a:solidFill>
+                  <a:schemeClr val="bg1"/>
+                </a:solidFill>
+              </a:rPr>
+              <a:t>Affichage d’une tâches sur le compte d’un élève que l’on suit (Bénévole)</a:t>
+            </a:r>
+          </a:p>
+          <a:p>
+            <a:pPr marL="285750" indent="-285750">
+              <a:buFontTx/>
+              <a:buChar char="-"/>
+            </a:pPr>
+            <a:r>
+              <a:rPr lang="fr-FR" sz="1000" dirty="0">
+                <a:solidFill>
+                  <a:schemeClr val="bg1"/>
+                </a:solidFill>
+              </a:rPr>
+              <a:t>Trie des différentes tâches</a:t>
+            </a:r>
+          </a:p>
+          <a:p>
+            <a:pPr marL="285750" indent="-285750">
+              <a:buFontTx/>
+              <a:buChar char="-"/>
+            </a:pPr>
+            <a:r>
+              <a:rPr lang="fr-FR" sz="1000" dirty="0">
+                <a:solidFill>
+                  <a:schemeClr val="bg1"/>
+                </a:solidFill>
+              </a:rPr>
+              <a:t>Recherche d’une tache spécifique</a:t>
+            </a:r>
+          </a:p>
+        </p:txBody>
+      </p:sp>
+      <p:sp>
+        <p:nvSpPr>
+          <p:cNvPr id="100" name="TextBox 4">
+            <a:extLst>
+              <a:ext uri="{FF2B5EF4-FFF2-40B4-BE49-F238E27FC236}">
+                <a16:creationId xmlns:a16="http://schemas.microsoft.com/office/drawing/2014/main" id="{F085E321-AA2D-A404-C623-F187F7B9B94A}"/>
+              </a:ext>
+            </a:extLst>
+          </p:cNvPr>
+          <p:cNvSpPr txBox="1"/>
+          <p:nvPr/>
+        </p:nvSpPr>
+        <p:spPr>
+          <a:xfrm>
+            <a:off x="311144" y="3015154"/>
+            <a:ext cx="3373001" cy="584775"/>
+          </a:xfrm>
+          <a:prstGeom prst="rect">
+            <a:avLst/>
+          </a:prstGeom>
+          <a:noFill/>
+        </p:spPr>
+        <p:txBody>
+          <a:bodyPr wrap="square">
+            <a:spAutoFit/>
+          </a:bodyPr>
+          <a:lstStyle/>
+          <a:p>
+            <a:pPr algn="ctr"/>
+            <a:r>
+              <a:rPr lang="en-US" sz="3200" b="1" dirty="0">
+                <a:solidFill>
+                  <a:schemeClr val="bg1"/>
+                </a:solidFill>
+                <a:latin typeface="Roboto" panose="02000000000000000000" pitchFamily="2" charset="0"/>
+                <a:ea typeface="Roboto" panose="02000000000000000000" pitchFamily="2" charset="0"/>
+              </a:rPr>
+              <a:t>To-do list</a:t>
+            </a:r>
+            <a:endParaRPr lang="en-IN" sz="3200" b="1" dirty="0">
+              <a:solidFill>
+                <a:schemeClr val="bg1"/>
+              </a:solidFill>
+              <a:latin typeface="Roboto" panose="02000000000000000000" pitchFamily="2" charset="0"/>
+              <a:ea typeface="Roboto" panose="02000000000000000000" pitchFamily="2" charset="0"/>
+            </a:endParaRPr>
+          </a:p>
+        </p:txBody>
+      </p:sp>
+      <p:sp>
+        <p:nvSpPr>
+          <p:cNvPr id="17" name="Oval 7">
+            <a:extLst>
+              <a:ext uri="{FF2B5EF4-FFF2-40B4-BE49-F238E27FC236}">
+                <a16:creationId xmlns:a16="http://schemas.microsoft.com/office/drawing/2014/main" id="{3FA0AFA9-B8FE-7118-9107-2882A06FA10A}"/>
+              </a:ext>
+            </a:extLst>
+          </p:cNvPr>
+          <p:cNvSpPr/>
+          <p:nvPr/>
+        </p:nvSpPr>
+        <p:spPr>
+          <a:xfrm>
+            <a:off x="7564017" y="4021266"/>
+            <a:ext cx="3144605" cy="722766"/>
+          </a:xfrm>
+          <a:prstGeom prst="ellipse">
+            <a:avLst/>
+          </a:prstGeom>
+          <a:solidFill>
+            <a:schemeClr val="accent1">
+              <a:lumMod val="40000"/>
+              <a:lumOff val="60000"/>
+            </a:schemeClr>
+          </a:solidFill>
+          <a:ln>
+            <a:noFill/>
+          </a:ln>
+        </p:spPr>
+        <p:style>
+          <a:lnRef idx="2">
+            <a:schemeClr val="accent1">
+              <a:shade val="50000"/>
+            </a:schemeClr>
+          </a:lnRef>
+          <a:fillRef idx="1">
+            <a:schemeClr val="accent1"/>
+          </a:fillRef>
+          <a:effectRef idx="0">
+            <a:schemeClr val="accent1"/>
+          </a:effectRef>
+          <a:fontRef idx="minor">
+            <a:schemeClr val="lt1"/>
+          </a:fontRef>
+        </p:style>
+        <p:txBody>
+          <a:bodyPr rtlCol="0" anchor="ctr"/>
+          <a:lstStyle/>
+          <a:p>
+            <a:pPr algn="ctr"/>
+            <a:r>
+              <a:rPr lang="en-US" sz="1400" dirty="0">
+                <a:solidFill>
+                  <a:schemeClr val="tx1"/>
+                </a:solidFill>
+                <a:latin typeface="Roboto" panose="02000000000000000000" pitchFamily="2" charset="0"/>
+                <a:ea typeface="Roboto" panose="02000000000000000000" pitchFamily="2" charset="0"/>
+              </a:rPr>
+              <a:t>Recherche de taches </a:t>
+            </a:r>
+            <a:r>
+              <a:rPr lang="en-US" sz="1400" dirty="0" err="1">
+                <a:solidFill>
+                  <a:schemeClr val="tx1"/>
+                </a:solidFill>
+                <a:latin typeface="Roboto" panose="02000000000000000000" pitchFamily="2" charset="0"/>
+                <a:ea typeface="Roboto" panose="02000000000000000000" pitchFamily="2" charset="0"/>
+              </a:rPr>
+              <a:t>spécifique</a:t>
+            </a:r>
+            <a:endParaRPr lang="en-IN" sz="1400" dirty="0">
+              <a:solidFill>
+                <a:schemeClr val="tx1"/>
+              </a:solidFill>
+              <a:latin typeface="Roboto" panose="02000000000000000000" pitchFamily="2" charset="0"/>
+              <a:ea typeface="Roboto" panose="02000000000000000000" pitchFamily="2" charset="0"/>
+            </a:endParaRPr>
+          </a:p>
+        </p:txBody>
+      </p:sp>
+      <p:cxnSp>
+        <p:nvCxnSpPr>
+          <p:cNvPr id="19" name="Straight Connector 24">
+            <a:extLst>
+              <a:ext uri="{FF2B5EF4-FFF2-40B4-BE49-F238E27FC236}">
+                <a16:creationId xmlns:a16="http://schemas.microsoft.com/office/drawing/2014/main" id="{D60F4398-69BE-C430-11D4-09D1AC4E8F8B}"/>
+              </a:ext>
+            </a:extLst>
+          </p:cNvPr>
+          <p:cNvCxnSpPr>
+            <a:cxnSpLocks/>
+            <a:stCxn id="38" idx="3"/>
+            <a:endCxn id="17" idx="2"/>
+          </p:cNvCxnSpPr>
+          <p:nvPr/>
+        </p:nvCxnSpPr>
+        <p:spPr>
+          <a:xfrm>
+            <a:off x="6403983" y="3083161"/>
+            <a:ext cx="1160034" cy="1299488"/>
+          </a:xfrm>
+          <a:prstGeom prst="line">
+            <a:avLst/>
+          </a:prstGeom>
+          <a:ln w="19050">
+            <a:solidFill>
+              <a:schemeClr val="bg1">
+                <a:lumMod val="50000"/>
+              </a:schemeClr>
+            </a:solidFill>
+            <a:prstDash val="sysDot"/>
+          </a:ln>
+        </p:spPr>
+        <p:style>
+          <a:lnRef idx="1">
+            <a:schemeClr val="accent1"/>
+          </a:lnRef>
+          <a:fillRef idx="0">
+            <a:schemeClr val="accent1"/>
+          </a:fillRef>
+          <a:effectRef idx="0">
+            <a:schemeClr val="accent1"/>
+          </a:effectRef>
+          <a:fontRef idx="minor">
+            <a:schemeClr val="tx1"/>
+          </a:fontRef>
+        </p:style>
+      </p:cxnSp>
+      <p:sp>
+        <p:nvSpPr>
+          <p:cNvPr id="41" name="Oval 7">
+            <a:extLst>
+              <a:ext uri="{FF2B5EF4-FFF2-40B4-BE49-F238E27FC236}">
+                <a16:creationId xmlns:a16="http://schemas.microsoft.com/office/drawing/2014/main" id="{385E9E9E-CC87-23AA-0641-546BC4EDF407}"/>
+              </a:ext>
+            </a:extLst>
+          </p:cNvPr>
+          <p:cNvSpPr/>
+          <p:nvPr/>
+        </p:nvSpPr>
+        <p:spPr>
+          <a:xfrm>
+            <a:off x="7564017" y="3026082"/>
+            <a:ext cx="3144605" cy="722766"/>
+          </a:xfrm>
+          <a:prstGeom prst="ellipse">
+            <a:avLst/>
+          </a:prstGeom>
+          <a:solidFill>
+            <a:schemeClr val="accent6">
+              <a:lumMod val="60000"/>
+              <a:lumOff val="40000"/>
+            </a:schemeClr>
+          </a:solidFill>
+          <a:ln>
+            <a:noFill/>
+          </a:ln>
+        </p:spPr>
+        <p:style>
+          <a:lnRef idx="2">
+            <a:schemeClr val="accent1">
+              <a:shade val="50000"/>
+            </a:schemeClr>
+          </a:lnRef>
+          <a:fillRef idx="1">
+            <a:schemeClr val="accent1"/>
+          </a:fillRef>
+          <a:effectRef idx="0">
+            <a:schemeClr val="accent1"/>
+          </a:effectRef>
+          <a:fontRef idx="minor">
+            <a:schemeClr val="lt1"/>
+          </a:fontRef>
+        </p:style>
+        <p:txBody>
+          <a:bodyPr rtlCol="0" anchor="ctr"/>
+          <a:lstStyle/>
+          <a:p>
+            <a:pPr algn="ctr"/>
+            <a:r>
+              <a:rPr lang="en-US" sz="1400" dirty="0" err="1">
+                <a:solidFill>
+                  <a:schemeClr val="tx1"/>
+                </a:solidFill>
+                <a:latin typeface="Roboto" panose="02000000000000000000" pitchFamily="2" charset="0"/>
+                <a:ea typeface="Roboto" panose="02000000000000000000" pitchFamily="2" charset="0"/>
+              </a:rPr>
+              <a:t>Classement</a:t>
+            </a:r>
+            <a:r>
+              <a:rPr lang="en-US" sz="1400" dirty="0">
+                <a:solidFill>
+                  <a:schemeClr val="tx1"/>
+                </a:solidFill>
+                <a:latin typeface="Roboto" panose="02000000000000000000" pitchFamily="2" charset="0"/>
+                <a:ea typeface="Roboto" panose="02000000000000000000" pitchFamily="2" charset="0"/>
+              </a:rPr>
+              <a:t> des taches par </a:t>
+            </a:r>
+            <a:r>
+              <a:rPr lang="en-US" sz="1400" dirty="0" err="1">
+                <a:solidFill>
+                  <a:schemeClr val="tx1"/>
+                </a:solidFill>
+                <a:latin typeface="Roboto" panose="02000000000000000000" pitchFamily="2" charset="0"/>
+                <a:ea typeface="Roboto" panose="02000000000000000000" pitchFamily="2" charset="0"/>
+              </a:rPr>
+              <a:t>statut</a:t>
+            </a:r>
+            <a:endParaRPr lang="en-IN" sz="1400" dirty="0">
+              <a:solidFill>
+                <a:schemeClr val="tx1"/>
+              </a:solidFill>
+              <a:latin typeface="Roboto" panose="02000000000000000000" pitchFamily="2" charset="0"/>
+              <a:ea typeface="Roboto" panose="02000000000000000000" pitchFamily="2" charset="0"/>
+            </a:endParaRPr>
+          </a:p>
+        </p:txBody>
+      </p:sp>
+      <p:sp>
+        <p:nvSpPr>
+          <p:cNvPr id="18" name="Oval 7">
+            <a:extLst>
+              <a:ext uri="{FF2B5EF4-FFF2-40B4-BE49-F238E27FC236}">
+                <a16:creationId xmlns:a16="http://schemas.microsoft.com/office/drawing/2014/main" id="{92698B5B-067F-9AE6-0EB1-B966D1B78222}"/>
+              </a:ext>
+            </a:extLst>
+          </p:cNvPr>
+          <p:cNvSpPr/>
+          <p:nvPr/>
+        </p:nvSpPr>
+        <p:spPr>
+          <a:xfrm>
+            <a:off x="7535507" y="5010331"/>
+            <a:ext cx="3144605" cy="722766"/>
+          </a:xfrm>
+          <a:prstGeom prst="ellipse">
+            <a:avLst/>
+          </a:prstGeom>
+          <a:solidFill>
+            <a:schemeClr val="accent2">
+              <a:lumMod val="75000"/>
+            </a:schemeClr>
+          </a:solidFill>
+          <a:ln>
+            <a:noFill/>
+          </a:ln>
+        </p:spPr>
+        <p:style>
+          <a:lnRef idx="2">
+            <a:schemeClr val="accent1">
+              <a:shade val="50000"/>
+            </a:schemeClr>
+          </a:lnRef>
+          <a:fillRef idx="1">
+            <a:schemeClr val="accent1"/>
+          </a:fillRef>
+          <a:effectRef idx="0">
+            <a:schemeClr val="accent1"/>
+          </a:effectRef>
+          <a:fontRef idx="minor">
+            <a:schemeClr val="lt1"/>
+          </a:fontRef>
+        </p:style>
+        <p:txBody>
+          <a:bodyPr rtlCol="0" anchor="ctr"/>
+          <a:lstStyle/>
+          <a:p>
+            <a:pPr algn="ctr"/>
+            <a:r>
+              <a:rPr lang="en-US" sz="1400" dirty="0" err="1">
+                <a:solidFill>
+                  <a:schemeClr val="tx1"/>
+                </a:solidFill>
+                <a:latin typeface="Roboto" panose="02000000000000000000" pitchFamily="2" charset="0"/>
+                <a:ea typeface="Roboto" panose="02000000000000000000" pitchFamily="2" charset="0"/>
+              </a:rPr>
+              <a:t>Ajout</a:t>
+            </a:r>
+            <a:r>
+              <a:rPr lang="en-US" sz="1400" dirty="0">
+                <a:solidFill>
+                  <a:schemeClr val="tx1"/>
+                </a:solidFill>
+                <a:latin typeface="Roboto" panose="02000000000000000000" pitchFamily="2" charset="0"/>
+                <a:ea typeface="Roboto" panose="02000000000000000000" pitchFamily="2" charset="0"/>
+              </a:rPr>
+              <a:t> </a:t>
+            </a:r>
+            <a:r>
+              <a:rPr lang="en-US" sz="1400" dirty="0" err="1">
+                <a:solidFill>
+                  <a:schemeClr val="tx1"/>
+                </a:solidFill>
+                <a:latin typeface="Roboto" panose="02000000000000000000" pitchFamily="2" charset="0"/>
+                <a:ea typeface="Roboto" panose="02000000000000000000" pitchFamily="2" charset="0"/>
+              </a:rPr>
+              <a:t>d’une</a:t>
+            </a:r>
+            <a:r>
+              <a:rPr lang="en-US" sz="1400" dirty="0">
+                <a:solidFill>
+                  <a:schemeClr val="tx1"/>
+                </a:solidFill>
+                <a:latin typeface="Roboto" panose="02000000000000000000" pitchFamily="2" charset="0"/>
+                <a:ea typeface="Roboto" panose="02000000000000000000" pitchFamily="2" charset="0"/>
+              </a:rPr>
+              <a:t> </a:t>
+            </a:r>
+            <a:r>
+              <a:rPr lang="en-US" sz="1400" dirty="0" err="1">
+                <a:solidFill>
+                  <a:schemeClr val="tx1"/>
+                </a:solidFill>
+                <a:latin typeface="Roboto" panose="02000000000000000000" pitchFamily="2" charset="0"/>
+                <a:ea typeface="Roboto" panose="02000000000000000000" pitchFamily="2" charset="0"/>
+              </a:rPr>
+              <a:t>tâche</a:t>
+            </a:r>
+            <a:r>
+              <a:rPr lang="en-US" sz="1400" dirty="0">
+                <a:solidFill>
+                  <a:schemeClr val="tx1"/>
+                </a:solidFill>
+                <a:latin typeface="Roboto" panose="02000000000000000000" pitchFamily="2" charset="0"/>
+                <a:ea typeface="Roboto" panose="02000000000000000000" pitchFamily="2" charset="0"/>
+              </a:rPr>
+              <a:t> </a:t>
+            </a:r>
+            <a:r>
+              <a:rPr lang="en-US" sz="1400" dirty="0" err="1">
+                <a:solidFill>
+                  <a:schemeClr val="tx1"/>
+                </a:solidFill>
+                <a:latin typeface="Roboto" panose="02000000000000000000" pitchFamily="2" charset="0"/>
+                <a:ea typeface="Roboto" panose="02000000000000000000" pitchFamily="2" charset="0"/>
+              </a:rPr>
+              <a:t>à</a:t>
+            </a:r>
+            <a:r>
+              <a:rPr lang="en-US" sz="1400" dirty="0">
+                <a:solidFill>
+                  <a:schemeClr val="tx1"/>
+                </a:solidFill>
+                <a:latin typeface="Roboto" panose="02000000000000000000" pitchFamily="2" charset="0"/>
+                <a:ea typeface="Roboto" panose="02000000000000000000" pitchFamily="2" charset="0"/>
+              </a:rPr>
+              <a:t> un </a:t>
+            </a:r>
+            <a:r>
+              <a:rPr lang="en-US" sz="1400" dirty="0" err="1">
+                <a:solidFill>
+                  <a:schemeClr val="tx1"/>
+                </a:solidFill>
+                <a:latin typeface="Roboto" panose="02000000000000000000" pitchFamily="2" charset="0"/>
+                <a:ea typeface="Roboto" panose="02000000000000000000" pitchFamily="2" charset="0"/>
+              </a:rPr>
+              <a:t>élève</a:t>
+            </a:r>
+            <a:endParaRPr lang="en-IN" sz="1400" dirty="0">
+              <a:solidFill>
+                <a:schemeClr val="tx1"/>
+              </a:solidFill>
+              <a:latin typeface="Roboto" panose="02000000000000000000" pitchFamily="2" charset="0"/>
+              <a:ea typeface="Roboto" panose="02000000000000000000" pitchFamily="2" charset="0"/>
+            </a:endParaRPr>
+          </a:p>
+        </p:txBody>
+      </p:sp>
+      <p:cxnSp>
+        <p:nvCxnSpPr>
+          <p:cNvPr id="20" name="Straight Connector 24">
+            <a:extLst>
+              <a:ext uri="{FF2B5EF4-FFF2-40B4-BE49-F238E27FC236}">
+                <a16:creationId xmlns:a16="http://schemas.microsoft.com/office/drawing/2014/main" id="{17E19AA3-33AA-5845-963A-281A23BEE826}"/>
+              </a:ext>
+            </a:extLst>
+          </p:cNvPr>
+          <p:cNvCxnSpPr>
+            <a:cxnSpLocks/>
+            <a:stCxn id="45" idx="3"/>
+            <a:endCxn id="18" idx="2"/>
+          </p:cNvCxnSpPr>
+          <p:nvPr/>
+        </p:nvCxnSpPr>
+        <p:spPr>
+          <a:xfrm>
+            <a:off x="4870236" y="5299885"/>
+            <a:ext cx="2665271" cy="71829"/>
+          </a:xfrm>
+          <a:prstGeom prst="line">
+            <a:avLst/>
+          </a:prstGeom>
+          <a:ln w="19050">
+            <a:solidFill>
+              <a:schemeClr val="bg1">
+                <a:lumMod val="50000"/>
+              </a:schemeClr>
+            </a:solidFill>
+            <a:prstDash val="sysDot"/>
+          </a:ln>
+        </p:spPr>
+        <p:style>
+          <a:lnRef idx="1">
+            <a:schemeClr val="accent1"/>
+          </a:lnRef>
+          <a:fillRef idx="0">
+            <a:schemeClr val="accent1"/>
+          </a:fillRef>
+          <a:effectRef idx="0">
+            <a:schemeClr val="accent1"/>
+          </a:effectRef>
+          <a:fontRef idx="minor">
+            <a:schemeClr val="tx1"/>
+          </a:fontRef>
+        </p:style>
+      </p:cxnSp>
+    </p:spTree>
+    <p:extLst>
+      <p:ext uri="{BB962C8B-B14F-4D97-AF65-F5344CB8AC3E}">
+        <p14:creationId xmlns:p14="http://schemas.microsoft.com/office/powerpoint/2010/main" val="3265101025"/>
+      </p:ext>
+    </p:extLst>
+  </p:cSld>
+  <p:clrMapOvr>
+    <a:masterClrMapping/>
+  </p:clrMapOvr>
+</p:sld>
+</file>
+
+<file path=ppt/slides/slide7.xml><?xml version="1.0" encoding="utf-8"?>
 <p:sld xmlns:a="http://schemas.openxmlformats.org/drawingml/2006/main" xmlns:r="http://schemas.openxmlformats.org/officeDocument/2006/relationships" xmlns:p="http://schemas.openxmlformats.org/presentationml/2006/main">
   <p:cSld>
     <p:spTree>

</xml_diff>

<commit_message>
FEAT:Add all UseCase pdf file
</commit_message>
<xml_diff>
--- a/Diagrammes_Cas_Dusages/DiagrammeUseCase.pptx
+++ b/Diagrammes_Cas_Dusages/DiagrammeUseCase.pptx
@@ -11,29 +11,28 @@
     <p:sldId id="260" r:id="rId5"/>
     <p:sldId id="261" r:id="rId6"/>
     <p:sldId id="262" r:id="rId7"/>
-    <p:sldId id="256" r:id="rId8"/>
   </p:sldIdLst>
   <p:sldSz cx="12192000" cy="6858000"/>
   <p:notesSz cx="6858000" cy="9144000"/>
   <p:embeddedFontLst>
     <p:embeddedFont>
       <p:font typeface="Calibri" panose="020F0502020204030204" pitchFamily="34" charset="0"/>
-      <p:regular r:id="rId9"/>
-      <p:bold r:id="rId10"/>
-      <p:italic r:id="rId11"/>
-      <p:boldItalic r:id="rId12"/>
+      <p:regular r:id="rId8"/>
+      <p:bold r:id="rId9"/>
+      <p:italic r:id="rId10"/>
+      <p:boldItalic r:id="rId11"/>
     </p:embeddedFont>
     <p:embeddedFont>
       <p:font typeface="Calibri Light" panose="020F0302020204030204" pitchFamily="34" charset="0"/>
-      <p:regular r:id="rId13"/>
-      <p:italic r:id="rId14"/>
+      <p:regular r:id="rId12"/>
+      <p:italic r:id="rId13"/>
     </p:embeddedFont>
     <p:embeddedFont>
       <p:font typeface="Roboto" panose="02000000000000000000" pitchFamily="2" charset="0"/>
-      <p:regular r:id="rId15"/>
-      <p:bold r:id="rId16"/>
-      <p:italic r:id="rId17"/>
-      <p:boldItalic r:id="rId18"/>
+      <p:regular r:id="rId14"/>
+      <p:bold r:id="rId15"/>
+      <p:italic r:id="rId16"/>
+      <p:boldItalic r:id="rId17"/>
     </p:embeddedFont>
   </p:embeddedFontLst>
   <p:defaultTextStyle>
@@ -12745,2115 +12744,6 @@
 </p:sld>
 </file>
 
-<file path=ppt/slides/slide7.xml><?xml version="1.0" encoding="utf-8"?>
-<p:sld xmlns:a="http://schemas.openxmlformats.org/drawingml/2006/main" xmlns:r="http://schemas.openxmlformats.org/officeDocument/2006/relationships" xmlns:p="http://schemas.openxmlformats.org/presentationml/2006/main">
-  <p:cSld>
-    <p:spTree>
-      <p:nvGrpSpPr>
-        <p:cNvPr id="1" name=""/>
-        <p:cNvGrpSpPr/>
-        <p:nvPr/>
-      </p:nvGrpSpPr>
-      <p:grpSpPr>
-        <a:xfrm>
-          <a:off x="0" y="0"/>
-          <a:ext cx="0" cy="0"/>
-          <a:chOff x="0" y="0"/>
-          <a:chExt cx="0" cy="0"/>
-        </a:xfrm>
-      </p:grpSpPr>
-      <p:sp>
-        <p:nvSpPr>
-          <p:cNvPr id="5" name="TextBox 4">
-            <a:extLst>
-              <a:ext uri="{FF2B5EF4-FFF2-40B4-BE49-F238E27FC236}">
-                <a16:creationId xmlns:a16="http://schemas.microsoft.com/office/drawing/2014/main" id="{99991F31-E066-4FAD-ADF1-459DD4691553}"/>
-              </a:ext>
-            </a:extLst>
-          </p:cNvPr>
-          <p:cNvSpPr txBox="1"/>
-          <p:nvPr/>
-        </p:nvSpPr>
-        <p:spPr>
-          <a:xfrm>
-            <a:off x="1743773" y="378471"/>
-            <a:ext cx="8704455" cy="584775"/>
-          </a:xfrm>
-          <a:prstGeom prst="rect">
-            <a:avLst/>
-          </a:prstGeom>
-          <a:noFill/>
-        </p:spPr>
-        <p:txBody>
-          <a:bodyPr wrap="square">
-            <a:spAutoFit/>
-          </a:bodyPr>
-          <a:lstStyle/>
-          <a:p>
-            <a:pPr algn="ctr"/>
-            <a:r>
-              <a:rPr lang="en-US" sz="3200" b="1" i="0" u="none" strike="noStrike" dirty="0">
-                <a:solidFill>
-                  <a:srgbClr val="000000"/>
-                </a:solidFill>
-                <a:effectLst/>
-                <a:latin typeface="Roboto" panose="02000000000000000000" pitchFamily="2" charset="0"/>
-                <a:ea typeface="Roboto" panose="02000000000000000000" pitchFamily="2" charset="0"/>
-              </a:rPr>
-              <a:t>Use case diagram template PowerPoint</a:t>
-            </a:r>
-            <a:r>
-              <a:rPr lang="en-US" sz="3200" b="1" dirty="0">
-                <a:latin typeface="Roboto" panose="02000000000000000000" pitchFamily="2" charset="0"/>
-                <a:ea typeface="Roboto" panose="02000000000000000000" pitchFamily="2" charset="0"/>
-              </a:rPr>
-              <a:t> </a:t>
-            </a:r>
-            <a:endParaRPr lang="en-IN" sz="3200" b="1" dirty="0">
-              <a:latin typeface="Roboto" panose="02000000000000000000" pitchFamily="2" charset="0"/>
-              <a:ea typeface="Roboto" panose="02000000000000000000" pitchFamily="2" charset="0"/>
-            </a:endParaRPr>
-          </a:p>
-        </p:txBody>
-      </p:sp>
-      <p:grpSp>
-        <p:nvGrpSpPr>
-          <p:cNvPr id="50" name="Group 49">
-            <a:extLst>
-              <a:ext uri="{FF2B5EF4-FFF2-40B4-BE49-F238E27FC236}">
-                <a16:creationId xmlns:a16="http://schemas.microsoft.com/office/drawing/2014/main" id="{4CF2F6FA-BCF2-4333-A66F-6B521659E954}"/>
-              </a:ext>
-            </a:extLst>
-          </p:cNvPr>
-          <p:cNvGrpSpPr/>
-          <p:nvPr/>
-        </p:nvGrpSpPr>
-        <p:grpSpPr>
-          <a:xfrm>
-            <a:off x="1118891" y="1315845"/>
-            <a:ext cx="9954218" cy="5203378"/>
-            <a:chOff x="1309267" y="1605776"/>
-            <a:chExt cx="8844920" cy="4623515"/>
-          </a:xfrm>
-        </p:grpSpPr>
-        <p:sp>
-          <p:nvSpPr>
-            <p:cNvPr id="6" name="Rectangle 5">
-              <a:extLst>
-                <a:ext uri="{FF2B5EF4-FFF2-40B4-BE49-F238E27FC236}">
-                  <a16:creationId xmlns:a16="http://schemas.microsoft.com/office/drawing/2014/main" id="{57A84098-F220-4A51-8EB1-737123BA5A1B}"/>
-                </a:ext>
-              </a:extLst>
-            </p:cNvPr>
-            <p:cNvSpPr/>
-            <p:nvPr/>
-          </p:nvSpPr>
-          <p:spPr>
-            <a:xfrm>
-              <a:off x="4259766" y="1605776"/>
-              <a:ext cx="2888166" cy="3334214"/>
-            </a:xfrm>
-            <a:prstGeom prst="rect">
-              <a:avLst/>
-            </a:prstGeom>
-            <a:solidFill>
-              <a:schemeClr val="bg1"/>
-            </a:solidFill>
-            <a:ln w="19050">
-              <a:solidFill>
-                <a:schemeClr val="tx1">
-                  <a:lumMod val="75000"/>
-                  <a:lumOff val="25000"/>
-                </a:schemeClr>
-              </a:solidFill>
-              <a:prstDash val="sysDot"/>
-            </a:ln>
-          </p:spPr>
-          <p:style>
-            <a:lnRef idx="2">
-              <a:schemeClr val="accent1">
-                <a:shade val="50000"/>
-              </a:schemeClr>
-            </a:lnRef>
-            <a:fillRef idx="1">
-              <a:schemeClr val="accent1"/>
-            </a:fillRef>
-            <a:effectRef idx="0">
-              <a:schemeClr val="accent1"/>
-            </a:effectRef>
-            <a:fontRef idx="minor">
-              <a:schemeClr val="lt1"/>
-            </a:fontRef>
-          </p:style>
-          <p:txBody>
-            <a:bodyPr rtlCol="0" anchor="ctr"/>
-            <a:lstStyle/>
-            <a:p>
-              <a:pPr algn="ctr"/>
-              <a:endParaRPr lang="en-IN">
-                <a:latin typeface="Roboto" panose="02000000000000000000" pitchFamily="2" charset="0"/>
-                <a:ea typeface="Roboto" panose="02000000000000000000" pitchFamily="2" charset="0"/>
-              </a:endParaRPr>
-            </a:p>
-          </p:txBody>
-        </p:sp>
-        <p:sp>
-          <p:nvSpPr>
-            <p:cNvPr id="7" name="Oval 6">
-              <a:extLst>
-                <a:ext uri="{FF2B5EF4-FFF2-40B4-BE49-F238E27FC236}">
-                  <a16:creationId xmlns:a16="http://schemas.microsoft.com/office/drawing/2014/main" id="{94C788CA-608B-4814-BD7B-9C30CB6AE18E}"/>
-                </a:ext>
-              </a:extLst>
-            </p:cNvPr>
-            <p:cNvSpPr/>
-            <p:nvPr/>
-          </p:nvSpPr>
-          <p:spPr>
-            <a:xfrm>
-              <a:off x="4650059" y="2334845"/>
-              <a:ext cx="2040673" cy="947854"/>
-            </a:xfrm>
-            <a:prstGeom prst="ellipse">
-              <a:avLst/>
-            </a:prstGeom>
-            <a:ln>
-              <a:noFill/>
-            </a:ln>
-          </p:spPr>
-          <p:style>
-            <a:lnRef idx="2">
-              <a:schemeClr val="accent1">
-                <a:shade val="50000"/>
-              </a:schemeClr>
-            </a:lnRef>
-            <a:fillRef idx="1">
-              <a:schemeClr val="accent1"/>
-            </a:fillRef>
-            <a:effectRef idx="0">
-              <a:schemeClr val="accent1"/>
-            </a:effectRef>
-            <a:fontRef idx="minor">
-              <a:schemeClr val="lt1"/>
-            </a:fontRef>
-          </p:style>
-          <p:txBody>
-            <a:bodyPr rtlCol="0" anchor="ctr"/>
-            <a:lstStyle/>
-            <a:p>
-              <a:pPr algn="ctr"/>
-              <a:r>
-                <a:rPr lang="en-US" dirty="0">
-                  <a:latin typeface="Roboto" panose="02000000000000000000" pitchFamily="2" charset="0"/>
-                  <a:ea typeface="Roboto" panose="02000000000000000000" pitchFamily="2" charset="0"/>
-                </a:rPr>
-                <a:t>Provide menu</a:t>
-              </a:r>
-              <a:endParaRPr lang="en-IN" dirty="0">
-                <a:latin typeface="Roboto" panose="02000000000000000000" pitchFamily="2" charset="0"/>
-                <a:ea typeface="Roboto" panose="02000000000000000000" pitchFamily="2" charset="0"/>
-              </a:endParaRPr>
-            </a:p>
-          </p:txBody>
-        </p:sp>
-        <p:sp>
-          <p:nvSpPr>
-            <p:cNvPr id="8" name="Oval 7">
-              <a:extLst>
-                <a:ext uri="{FF2B5EF4-FFF2-40B4-BE49-F238E27FC236}">
-                  <a16:creationId xmlns:a16="http://schemas.microsoft.com/office/drawing/2014/main" id="{D30D4968-3968-4096-A90E-93C818413A52}"/>
-                </a:ext>
-              </a:extLst>
-            </p:cNvPr>
-            <p:cNvSpPr/>
-            <p:nvPr/>
-          </p:nvSpPr>
-          <p:spPr>
-            <a:xfrm>
-              <a:off x="4650059" y="3808141"/>
-              <a:ext cx="2040673" cy="947854"/>
-            </a:xfrm>
-            <a:prstGeom prst="ellipse">
-              <a:avLst/>
-            </a:prstGeom>
-            <a:solidFill>
-              <a:schemeClr val="accent2"/>
-            </a:solidFill>
-            <a:ln>
-              <a:noFill/>
-            </a:ln>
-          </p:spPr>
-          <p:style>
-            <a:lnRef idx="2">
-              <a:schemeClr val="accent1">
-                <a:shade val="50000"/>
-              </a:schemeClr>
-            </a:lnRef>
-            <a:fillRef idx="1">
-              <a:schemeClr val="accent1"/>
-            </a:fillRef>
-            <a:effectRef idx="0">
-              <a:schemeClr val="accent1"/>
-            </a:effectRef>
-            <a:fontRef idx="minor">
-              <a:schemeClr val="lt1"/>
-            </a:fontRef>
-          </p:style>
-          <p:txBody>
-            <a:bodyPr rtlCol="0" anchor="ctr"/>
-            <a:lstStyle/>
-            <a:p>
-              <a:pPr algn="ctr"/>
-              <a:r>
-                <a:rPr lang="en-US" dirty="0">
-                  <a:latin typeface="Roboto" panose="02000000000000000000" pitchFamily="2" charset="0"/>
-                  <a:ea typeface="Roboto" panose="02000000000000000000" pitchFamily="2" charset="0"/>
-                </a:rPr>
-                <a:t>Provide menu</a:t>
-              </a:r>
-              <a:endParaRPr lang="en-IN" dirty="0">
-                <a:latin typeface="Roboto" panose="02000000000000000000" pitchFamily="2" charset="0"/>
-                <a:ea typeface="Roboto" panose="02000000000000000000" pitchFamily="2" charset="0"/>
-              </a:endParaRPr>
-            </a:p>
-          </p:txBody>
-        </p:sp>
-        <p:sp>
-          <p:nvSpPr>
-            <p:cNvPr id="9" name="Oval 8">
-              <a:extLst>
-                <a:ext uri="{FF2B5EF4-FFF2-40B4-BE49-F238E27FC236}">
-                  <a16:creationId xmlns:a16="http://schemas.microsoft.com/office/drawing/2014/main" id="{767FAAD6-FE15-4CEF-9E5A-E7E47D3EC847}"/>
-                </a:ext>
-              </a:extLst>
-            </p:cNvPr>
-            <p:cNvSpPr/>
-            <p:nvPr/>
-          </p:nvSpPr>
-          <p:spPr>
-            <a:xfrm>
-              <a:off x="4650059" y="5281437"/>
-              <a:ext cx="2040673" cy="947854"/>
-            </a:xfrm>
-            <a:prstGeom prst="ellipse">
-              <a:avLst/>
-            </a:prstGeom>
-            <a:solidFill>
-              <a:schemeClr val="accent3"/>
-            </a:solidFill>
-            <a:ln>
-              <a:noFill/>
-            </a:ln>
-          </p:spPr>
-          <p:style>
-            <a:lnRef idx="2">
-              <a:schemeClr val="accent1">
-                <a:shade val="50000"/>
-              </a:schemeClr>
-            </a:lnRef>
-            <a:fillRef idx="1">
-              <a:schemeClr val="accent1"/>
-            </a:fillRef>
-            <a:effectRef idx="0">
-              <a:schemeClr val="accent1"/>
-            </a:effectRef>
-            <a:fontRef idx="minor">
-              <a:schemeClr val="lt1"/>
-            </a:fontRef>
-          </p:style>
-          <p:txBody>
-            <a:bodyPr rtlCol="0" anchor="ctr"/>
-            <a:lstStyle/>
-            <a:p>
-              <a:pPr algn="ctr"/>
-              <a:r>
-                <a:rPr lang="en-US" dirty="0">
-                  <a:latin typeface="Roboto" panose="02000000000000000000" pitchFamily="2" charset="0"/>
-                  <a:ea typeface="Roboto" panose="02000000000000000000" pitchFamily="2" charset="0"/>
-                </a:rPr>
-                <a:t>Deliver meal</a:t>
-              </a:r>
-              <a:endParaRPr lang="en-IN" dirty="0">
-                <a:latin typeface="Roboto" panose="02000000000000000000" pitchFamily="2" charset="0"/>
-                <a:ea typeface="Roboto" panose="02000000000000000000" pitchFamily="2" charset="0"/>
-              </a:endParaRPr>
-            </a:p>
-          </p:txBody>
-        </p:sp>
-        <p:sp>
-          <p:nvSpPr>
-            <p:cNvPr id="18" name="TextBox 17">
-              <a:extLst>
-                <a:ext uri="{FF2B5EF4-FFF2-40B4-BE49-F238E27FC236}">
-                  <a16:creationId xmlns:a16="http://schemas.microsoft.com/office/drawing/2014/main" id="{C22369B0-2A7C-4AE3-9345-767F8162C7F9}"/>
-                </a:ext>
-              </a:extLst>
-            </p:cNvPr>
-            <p:cNvSpPr txBox="1"/>
-            <p:nvPr/>
-          </p:nvSpPr>
-          <p:spPr>
-            <a:xfrm>
-              <a:off x="4393580" y="1711042"/>
-              <a:ext cx="2381846" cy="328174"/>
-            </a:xfrm>
-            <a:prstGeom prst="rect">
-              <a:avLst/>
-            </a:prstGeom>
-            <a:noFill/>
-          </p:spPr>
-          <p:txBody>
-            <a:bodyPr wrap="square" rtlCol="0">
-              <a:spAutoFit/>
-            </a:bodyPr>
-            <a:lstStyle/>
-            <a:p>
-              <a:pPr algn="ctr"/>
-              <a:r>
-                <a:rPr lang="en-US" b="1" dirty="0">
-                  <a:latin typeface="Roboto" panose="02000000000000000000" pitchFamily="2" charset="0"/>
-                  <a:ea typeface="Roboto" panose="02000000000000000000" pitchFamily="2" charset="0"/>
-                </a:rPr>
-                <a:t>Dinner now system</a:t>
-              </a:r>
-              <a:endParaRPr lang="en-IN" b="1" dirty="0">
-                <a:latin typeface="Roboto" panose="02000000000000000000" pitchFamily="2" charset="0"/>
-                <a:ea typeface="Roboto" panose="02000000000000000000" pitchFamily="2" charset="0"/>
-              </a:endParaRPr>
-            </a:p>
-          </p:txBody>
-        </p:sp>
-        <p:cxnSp>
-          <p:nvCxnSpPr>
-            <p:cNvPr id="22" name="Straight Connector 21">
-              <a:extLst>
-                <a:ext uri="{FF2B5EF4-FFF2-40B4-BE49-F238E27FC236}">
-                  <a16:creationId xmlns:a16="http://schemas.microsoft.com/office/drawing/2014/main" id="{75B57B82-22F7-4ED8-9FDB-0492B65D476C}"/>
-                </a:ext>
-              </a:extLst>
-            </p:cNvPr>
-            <p:cNvCxnSpPr>
-              <a:cxnSpLocks/>
-              <a:endCxn id="7" idx="2"/>
-            </p:cNvCxnSpPr>
-            <p:nvPr/>
-          </p:nvCxnSpPr>
-          <p:spPr>
-            <a:xfrm flipV="1">
-              <a:off x="2647414" y="2808772"/>
-              <a:ext cx="2002645" cy="999370"/>
-            </a:xfrm>
-            <a:prstGeom prst="line">
-              <a:avLst/>
-            </a:prstGeom>
-            <a:ln w="19050">
-              <a:solidFill>
-                <a:schemeClr val="bg1">
-                  <a:lumMod val="50000"/>
-                </a:schemeClr>
-              </a:solidFill>
-              <a:prstDash val="sysDot"/>
-            </a:ln>
-          </p:spPr>
-          <p:style>
-            <a:lnRef idx="1">
-              <a:schemeClr val="accent1"/>
-            </a:lnRef>
-            <a:fillRef idx="0">
-              <a:schemeClr val="accent1"/>
-            </a:fillRef>
-            <a:effectRef idx="0">
-              <a:schemeClr val="accent1"/>
-            </a:effectRef>
-            <a:fontRef idx="minor">
-              <a:schemeClr val="tx1"/>
-            </a:fontRef>
-          </p:style>
-        </p:cxnSp>
-        <p:cxnSp>
-          <p:nvCxnSpPr>
-            <p:cNvPr id="23" name="Straight Connector 22">
-              <a:extLst>
-                <a:ext uri="{FF2B5EF4-FFF2-40B4-BE49-F238E27FC236}">
-                  <a16:creationId xmlns:a16="http://schemas.microsoft.com/office/drawing/2014/main" id="{2754E3F2-B607-479E-B66B-932300425394}"/>
-                </a:ext>
-              </a:extLst>
-            </p:cNvPr>
-            <p:cNvCxnSpPr>
-              <a:cxnSpLocks/>
-              <a:endCxn id="9" idx="2"/>
-            </p:cNvCxnSpPr>
-            <p:nvPr/>
-          </p:nvCxnSpPr>
-          <p:spPr>
-            <a:xfrm>
-              <a:off x="2647414" y="4062556"/>
-              <a:ext cx="2002645" cy="1692808"/>
-            </a:xfrm>
-            <a:prstGeom prst="line">
-              <a:avLst/>
-            </a:prstGeom>
-            <a:ln w="19050">
-              <a:solidFill>
-                <a:schemeClr val="bg1">
-                  <a:lumMod val="50000"/>
-                </a:schemeClr>
-              </a:solidFill>
-              <a:prstDash val="sysDot"/>
-            </a:ln>
-          </p:spPr>
-          <p:style>
-            <a:lnRef idx="1">
-              <a:schemeClr val="accent1"/>
-            </a:lnRef>
-            <a:fillRef idx="0">
-              <a:schemeClr val="accent1"/>
-            </a:fillRef>
-            <a:effectRef idx="0">
-              <a:schemeClr val="accent1"/>
-            </a:effectRef>
-            <a:fontRef idx="minor">
-              <a:schemeClr val="tx1"/>
-            </a:fontRef>
-          </p:style>
-        </p:cxnSp>
-        <p:cxnSp>
-          <p:nvCxnSpPr>
-            <p:cNvPr id="25" name="Straight Connector 24">
-              <a:extLst>
-                <a:ext uri="{FF2B5EF4-FFF2-40B4-BE49-F238E27FC236}">
-                  <a16:creationId xmlns:a16="http://schemas.microsoft.com/office/drawing/2014/main" id="{3633A7B2-971B-43BF-A97B-9726C63489DC}"/>
-                </a:ext>
-              </a:extLst>
-            </p:cNvPr>
-            <p:cNvCxnSpPr>
-              <a:cxnSpLocks/>
-              <a:endCxn id="8" idx="2"/>
-            </p:cNvCxnSpPr>
-            <p:nvPr/>
-          </p:nvCxnSpPr>
-          <p:spPr>
-            <a:xfrm>
-              <a:off x="2647414" y="4049227"/>
-              <a:ext cx="2002645" cy="232841"/>
-            </a:xfrm>
-            <a:prstGeom prst="line">
-              <a:avLst/>
-            </a:prstGeom>
-            <a:ln w="19050">
-              <a:solidFill>
-                <a:schemeClr val="bg1">
-                  <a:lumMod val="50000"/>
-                </a:schemeClr>
-              </a:solidFill>
-              <a:prstDash val="sysDot"/>
-            </a:ln>
-          </p:spPr>
-          <p:style>
-            <a:lnRef idx="1">
-              <a:schemeClr val="accent1"/>
-            </a:lnRef>
-            <a:fillRef idx="0">
-              <a:schemeClr val="accent1"/>
-            </a:fillRef>
-            <a:effectRef idx="0">
-              <a:schemeClr val="accent1"/>
-            </a:effectRef>
-            <a:fontRef idx="minor">
-              <a:schemeClr val="tx1"/>
-            </a:fontRef>
-          </p:style>
-        </p:cxnSp>
-        <p:cxnSp>
-          <p:nvCxnSpPr>
-            <p:cNvPr id="30" name="Straight Connector 29">
-              <a:extLst>
-                <a:ext uri="{FF2B5EF4-FFF2-40B4-BE49-F238E27FC236}">
-                  <a16:creationId xmlns:a16="http://schemas.microsoft.com/office/drawing/2014/main" id="{8CF014E9-4F7D-4303-B721-CDE8D1C8DFB1}"/>
-                </a:ext>
-              </a:extLst>
-            </p:cNvPr>
-            <p:cNvCxnSpPr>
-              <a:cxnSpLocks/>
-              <a:stCxn id="7" idx="6"/>
-            </p:cNvCxnSpPr>
-            <p:nvPr/>
-          </p:nvCxnSpPr>
-          <p:spPr>
-            <a:xfrm>
-              <a:off x="6690732" y="2808772"/>
-              <a:ext cx="1808499" cy="1020803"/>
-            </a:xfrm>
-            <a:prstGeom prst="line">
-              <a:avLst/>
-            </a:prstGeom>
-            <a:ln w="19050">
-              <a:solidFill>
-                <a:schemeClr val="bg1">
-                  <a:lumMod val="50000"/>
-                </a:schemeClr>
-              </a:solidFill>
-              <a:prstDash val="sysDot"/>
-            </a:ln>
-          </p:spPr>
-          <p:style>
-            <a:lnRef idx="1">
-              <a:schemeClr val="accent1"/>
-            </a:lnRef>
-            <a:fillRef idx="0">
-              <a:schemeClr val="accent1"/>
-            </a:fillRef>
-            <a:effectRef idx="0">
-              <a:schemeClr val="accent1"/>
-            </a:effectRef>
-            <a:fontRef idx="minor">
-              <a:schemeClr val="tx1"/>
-            </a:fontRef>
-          </p:style>
-        </p:cxnSp>
-        <p:cxnSp>
-          <p:nvCxnSpPr>
-            <p:cNvPr id="33" name="Straight Connector 32">
-              <a:extLst>
-                <a:ext uri="{FF2B5EF4-FFF2-40B4-BE49-F238E27FC236}">
-                  <a16:creationId xmlns:a16="http://schemas.microsoft.com/office/drawing/2014/main" id="{A6B94B3C-ABF6-4CDC-8803-3C7D5207B470}"/>
-                </a:ext>
-              </a:extLst>
-            </p:cNvPr>
-            <p:cNvCxnSpPr>
-              <a:cxnSpLocks/>
-              <a:stCxn id="9" idx="6"/>
-            </p:cNvCxnSpPr>
-            <p:nvPr/>
-          </p:nvCxnSpPr>
-          <p:spPr>
-            <a:xfrm flipV="1">
-              <a:off x="6690732" y="3921574"/>
-              <a:ext cx="1808499" cy="1833790"/>
-            </a:xfrm>
-            <a:prstGeom prst="line">
-              <a:avLst/>
-            </a:prstGeom>
-            <a:ln w="19050">
-              <a:solidFill>
-                <a:schemeClr val="bg1">
-                  <a:lumMod val="50000"/>
-                </a:schemeClr>
-              </a:solidFill>
-              <a:prstDash val="sysDot"/>
-            </a:ln>
-          </p:spPr>
-          <p:style>
-            <a:lnRef idx="1">
-              <a:schemeClr val="accent1"/>
-            </a:lnRef>
-            <a:fillRef idx="0">
-              <a:schemeClr val="accent1"/>
-            </a:fillRef>
-            <a:effectRef idx="0">
-              <a:schemeClr val="accent1"/>
-            </a:effectRef>
-            <a:fontRef idx="minor">
-              <a:schemeClr val="tx1"/>
-            </a:fontRef>
-          </p:style>
-        </p:cxnSp>
-        <p:sp>
-          <p:nvSpPr>
-            <p:cNvPr id="36" name="Oval 35">
-              <a:extLst>
-                <a:ext uri="{FF2B5EF4-FFF2-40B4-BE49-F238E27FC236}">
-                  <a16:creationId xmlns:a16="http://schemas.microsoft.com/office/drawing/2014/main" id="{10FFCA46-FA6A-481C-9038-1DF3EFDCE968}"/>
-                </a:ext>
-              </a:extLst>
-            </p:cNvPr>
-            <p:cNvSpPr/>
-            <p:nvPr/>
-          </p:nvSpPr>
-          <p:spPr>
-            <a:xfrm>
-              <a:off x="5542156" y="2181402"/>
-              <a:ext cx="323386" cy="323386"/>
-            </a:xfrm>
-            <a:prstGeom prst="ellipse">
-              <a:avLst/>
-            </a:prstGeom>
-            <a:solidFill>
-              <a:schemeClr val="tx1"/>
-            </a:solidFill>
-            <a:ln>
-              <a:noFill/>
-            </a:ln>
-          </p:spPr>
-          <p:style>
-            <a:lnRef idx="2">
-              <a:schemeClr val="accent1">
-                <a:shade val="50000"/>
-              </a:schemeClr>
-            </a:lnRef>
-            <a:fillRef idx="1">
-              <a:schemeClr val="accent1"/>
-            </a:fillRef>
-            <a:effectRef idx="0">
-              <a:schemeClr val="accent1"/>
-            </a:effectRef>
-            <a:fontRef idx="minor">
-              <a:schemeClr val="lt1"/>
-            </a:fontRef>
-          </p:style>
-          <p:txBody>
-            <a:bodyPr rtlCol="0" anchor="ctr"/>
-            <a:lstStyle/>
-            <a:p>
-              <a:pPr algn="ctr"/>
-              <a:r>
-                <a:rPr lang="en-US" sz="1400" b="1" dirty="0">
-                  <a:latin typeface="Roboto" panose="02000000000000000000" pitchFamily="2" charset="0"/>
-                  <a:ea typeface="Roboto" panose="02000000000000000000" pitchFamily="2" charset="0"/>
-                </a:rPr>
-                <a:t>2</a:t>
-              </a:r>
-              <a:endParaRPr lang="en-IN" sz="1400" b="1" dirty="0">
-                <a:latin typeface="Roboto" panose="02000000000000000000" pitchFamily="2" charset="0"/>
-                <a:ea typeface="Roboto" panose="02000000000000000000" pitchFamily="2" charset="0"/>
-              </a:endParaRPr>
-            </a:p>
-          </p:txBody>
-        </p:sp>
-        <p:sp>
-          <p:nvSpPr>
-            <p:cNvPr id="38" name="Oval 37">
-              <a:extLst>
-                <a:ext uri="{FF2B5EF4-FFF2-40B4-BE49-F238E27FC236}">
-                  <a16:creationId xmlns:a16="http://schemas.microsoft.com/office/drawing/2014/main" id="{A543DC2B-5B08-4346-8F67-D20A6BB4A8B8}"/>
-                </a:ext>
-              </a:extLst>
-            </p:cNvPr>
-            <p:cNvSpPr/>
-            <p:nvPr/>
-          </p:nvSpPr>
-          <p:spPr>
-            <a:xfrm>
-              <a:off x="5542156" y="3624146"/>
-              <a:ext cx="323386" cy="323386"/>
-            </a:xfrm>
-            <a:prstGeom prst="ellipse">
-              <a:avLst/>
-            </a:prstGeom>
-            <a:solidFill>
-              <a:schemeClr val="tx1"/>
-            </a:solidFill>
-            <a:ln>
-              <a:noFill/>
-            </a:ln>
-          </p:spPr>
-          <p:style>
-            <a:lnRef idx="2">
-              <a:schemeClr val="accent1">
-                <a:shade val="50000"/>
-              </a:schemeClr>
-            </a:lnRef>
-            <a:fillRef idx="1">
-              <a:schemeClr val="accent1"/>
-            </a:fillRef>
-            <a:effectRef idx="0">
-              <a:schemeClr val="accent1"/>
-            </a:effectRef>
-            <a:fontRef idx="minor">
-              <a:schemeClr val="lt1"/>
-            </a:fontRef>
-          </p:style>
-          <p:txBody>
-            <a:bodyPr rtlCol="0" anchor="ctr"/>
-            <a:lstStyle/>
-            <a:p>
-              <a:pPr algn="ctr"/>
-              <a:r>
-                <a:rPr lang="en-US" sz="1400" b="1" dirty="0">
-                  <a:latin typeface="Roboto" panose="02000000000000000000" pitchFamily="2" charset="0"/>
-                  <a:ea typeface="Roboto" panose="02000000000000000000" pitchFamily="2" charset="0"/>
-                </a:rPr>
-                <a:t>2</a:t>
-              </a:r>
-              <a:endParaRPr lang="en-IN" sz="1400" b="1" dirty="0">
-                <a:latin typeface="Roboto" panose="02000000000000000000" pitchFamily="2" charset="0"/>
-                <a:ea typeface="Roboto" panose="02000000000000000000" pitchFamily="2" charset="0"/>
-              </a:endParaRPr>
-            </a:p>
-          </p:txBody>
-        </p:sp>
-        <p:sp>
-          <p:nvSpPr>
-            <p:cNvPr id="39" name="Oval 38">
-              <a:extLst>
-                <a:ext uri="{FF2B5EF4-FFF2-40B4-BE49-F238E27FC236}">
-                  <a16:creationId xmlns:a16="http://schemas.microsoft.com/office/drawing/2014/main" id="{09AB32F6-F889-4832-B1E4-3AC4C32EEA38}"/>
-                </a:ext>
-              </a:extLst>
-            </p:cNvPr>
-            <p:cNvSpPr/>
-            <p:nvPr/>
-          </p:nvSpPr>
-          <p:spPr>
-            <a:xfrm>
-              <a:off x="5542156" y="5140712"/>
-              <a:ext cx="323386" cy="323386"/>
-            </a:xfrm>
-            <a:prstGeom prst="ellipse">
-              <a:avLst/>
-            </a:prstGeom>
-            <a:solidFill>
-              <a:schemeClr val="tx1"/>
-            </a:solidFill>
-            <a:ln>
-              <a:noFill/>
-            </a:ln>
-          </p:spPr>
-          <p:style>
-            <a:lnRef idx="2">
-              <a:schemeClr val="accent1">
-                <a:shade val="50000"/>
-              </a:schemeClr>
-            </a:lnRef>
-            <a:fillRef idx="1">
-              <a:schemeClr val="accent1"/>
-            </a:fillRef>
-            <a:effectRef idx="0">
-              <a:schemeClr val="accent1"/>
-            </a:effectRef>
-            <a:fontRef idx="minor">
-              <a:schemeClr val="lt1"/>
-            </a:fontRef>
-          </p:style>
-          <p:txBody>
-            <a:bodyPr rtlCol="0" anchor="ctr"/>
-            <a:lstStyle/>
-            <a:p>
-              <a:pPr algn="ctr"/>
-              <a:r>
-                <a:rPr lang="en-US" sz="1400" b="1" dirty="0">
-                  <a:latin typeface="Roboto" panose="02000000000000000000" pitchFamily="2" charset="0"/>
-                  <a:ea typeface="Roboto" panose="02000000000000000000" pitchFamily="2" charset="0"/>
-                </a:rPr>
-                <a:t>2</a:t>
-              </a:r>
-              <a:endParaRPr lang="en-IN" sz="1400" b="1" dirty="0">
-                <a:latin typeface="Roboto" panose="02000000000000000000" pitchFamily="2" charset="0"/>
-                <a:ea typeface="Roboto" panose="02000000000000000000" pitchFamily="2" charset="0"/>
-              </a:endParaRPr>
-            </a:p>
-          </p:txBody>
-        </p:sp>
-        <p:sp>
-          <p:nvSpPr>
-            <p:cNvPr id="40" name="Oval 39">
-              <a:extLst>
-                <a:ext uri="{FF2B5EF4-FFF2-40B4-BE49-F238E27FC236}">
-                  <a16:creationId xmlns:a16="http://schemas.microsoft.com/office/drawing/2014/main" id="{F603DFD8-E231-4A2C-B3EA-5E1FC4BAC0D5}"/>
-                </a:ext>
-              </a:extLst>
-            </p:cNvPr>
-            <p:cNvSpPr/>
-            <p:nvPr/>
-          </p:nvSpPr>
-          <p:spPr>
-            <a:xfrm>
-              <a:off x="7433288" y="3170457"/>
-              <a:ext cx="323386" cy="323386"/>
-            </a:xfrm>
-            <a:prstGeom prst="ellipse">
-              <a:avLst/>
-            </a:prstGeom>
-            <a:solidFill>
-              <a:schemeClr val="tx1"/>
-            </a:solidFill>
-            <a:ln>
-              <a:noFill/>
-            </a:ln>
-          </p:spPr>
-          <p:style>
-            <a:lnRef idx="2">
-              <a:schemeClr val="accent1">
-                <a:shade val="50000"/>
-              </a:schemeClr>
-            </a:lnRef>
-            <a:fillRef idx="1">
-              <a:schemeClr val="accent1"/>
-            </a:fillRef>
-            <a:effectRef idx="0">
-              <a:schemeClr val="accent1"/>
-            </a:effectRef>
-            <a:fontRef idx="minor">
-              <a:schemeClr val="lt1"/>
-            </a:fontRef>
-          </p:style>
-          <p:txBody>
-            <a:bodyPr rtlCol="0" anchor="ctr"/>
-            <a:lstStyle/>
-            <a:p>
-              <a:pPr algn="ctr"/>
-              <a:r>
-                <a:rPr lang="en-US" sz="1400" b="1" dirty="0">
-                  <a:latin typeface="Roboto" panose="02000000000000000000" pitchFamily="2" charset="0"/>
-                  <a:ea typeface="Roboto" panose="02000000000000000000" pitchFamily="2" charset="0"/>
-                </a:rPr>
-                <a:t>3</a:t>
-              </a:r>
-              <a:endParaRPr lang="en-IN" sz="1400" b="1" dirty="0">
-                <a:latin typeface="Roboto" panose="02000000000000000000" pitchFamily="2" charset="0"/>
-                <a:ea typeface="Roboto" panose="02000000000000000000" pitchFamily="2" charset="0"/>
-              </a:endParaRPr>
-            </a:p>
-          </p:txBody>
-        </p:sp>
-        <p:sp>
-          <p:nvSpPr>
-            <p:cNvPr id="41" name="Oval 40">
-              <a:extLst>
-                <a:ext uri="{FF2B5EF4-FFF2-40B4-BE49-F238E27FC236}">
-                  <a16:creationId xmlns:a16="http://schemas.microsoft.com/office/drawing/2014/main" id="{A158F65C-6167-4423-96DC-0870B3C970CF}"/>
-                </a:ext>
-              </a:extLst>
-            </p:cNvPr>
-            <p:cNvSpPr/>
-            <p:nvPr/>
-          </p:nvSpPr>
-          <p:spPr>
-            <a:xfrm>
-              <a:off x="7433288" y="4676776"/>
-              <a:ext cx="323386" cy="323386"/>
-            </a:xfrm>
-            <a:prstGeom prst="ellipse">
-              <a:avLst/>
-            </a:prstGeom>
-            <a:solidFill>
-              <a:schemeClr val="tx1"/>
-            </a:solidFill>
-            <a:ln>
-              <a:noFill/>
-            </a:ln>
-          </p:spPr>
-          <p:style>
-            <a:lnRef idx="2">
-              <a:schemeClr val="accent1">
-                <a:shade val="50000"/>
-              </a:schemeClr>
-            </a:lnRef>
-            <a:fillRef idx="1">
-              <a:schemeClr val="accent1"/>
-            </a:fillRef>
-            <a:effectRef idx="0">
-              <a:schemeClr val="accent1"/>
-            </a:effectRef>
-            <a:fontRef idx="minor">
-              <a:schemeClr val="lt1"/>
-            </a:fontRef>
-          </p:style>
-          <p:txBody>
-            <a:bodyPr rtlCol="0" anchor="ctr"/>
-            <a:lstStyle/>
-            <a:p>
-              <a:pPr algn="ctr"/>
-              <a:r>
-                <a:rPr lang="en-US" sz="1400" b="1" dirty="0">
-                  <a:latin typeface="Roboto" panose="02000000000000000000" pitchFamily="2" charset="0"/>
-                  <a:ea typeface="Roboto" panose="02000000000000000000" pitchFamily="2" charset="0"/>
-                </a:rPr>
-                <a:t>3</a:t>
-              </a:r>
-              <a:endParaRPr lang="en-IN" sz="1400" b="1" dirty="0">
-                <a:latin typeface="Roboto" panose="02000000000000000000" pitchFamily="2" charset="0"/>
-                <a:ea typeface="Roboto" panose="02000000000000000000" pitchFamily="2" charset="0"/>
-              </a:endParaRPr>
-            </a:p>
-          </p:txBody>
-        </p:sp>
-        <p:sp>
-          <p:nvSpPr>
-            <p:cNvPr id="42" name="Oval 41">
-              <a:extLst>
-                <a:ext uri="{FF2B5EF4-FFF2-40B4-BE49-F238E27FC236}">
-                  <a16:creationId xmlns:a16="http://schemas.microsoft.com/office/drawing/2014/main" id="{90083B2A-47A9-4332-ADE4-039E4B1FED02}"/>
-                </a:ext>
-              </a:extLst>
-            </p:cNvPr>
-            <p:cNvSpPr/>
-            <p:nvPr/>
-          </p:nvSpPr>
-          <p:spPr>
-            <a:xfrm>
-              <a:off x="3348653" y="4676776"/>
-              <a:ext cx="323386" cy="323386"/>
-            </a:xfrm>
-            <a:prstGeom prst="ellipse">
-              <a:avLst/>
-            </a:prstGeom>
-            <a:solidFill>
-              <a:schemeClr val="tx1"/>
-            </a:solidFill>
-            <a:ln>
-              <a:noFill/>
-            </a:ln>
-          </p:spPr>
-          <p:style>
-            <a:lnRef idx="2">
-              <a:schemeClr val="accent1">
-                <a:shade val="50000"/>
-              </a:schemeClr>
-            </a:lnRef>
-            <a:fillRef idx="1">
-              <a:schemeClr val="accent1"/>
-            </a:fillRef>
-            <a:effectRef idx="0">
-              <a:schemeClr val="accent1"/>
-            </a:effectRef>
-            <a:fontRef idx="minor">
-              <a:schemeClr val="lt1"/>
-            </a:fontRef>
-          </p:style>
-          <p:txBody>
-            <a:bodyPr rtlCol="0" anchor="ctr"/>
-            <a:lstStyle/>
-            <a:p>
-              <a:pPr algn="ctr"/>
-              <a:r>
-                <a:rPr lang="en-US" sz="1400" b="1" dirty="0">
-                  <a:latin typeface="Roboto" panose="02000000000000000000" pitchFamily="2" charset="0"/>
-                  <a:ea typeface="Roboto" panose="02000000000000000000" pitchFamily="2" charset="0"/>
-                </a:rPr>
-                <a:t>3</a:t>
-              </a:r>
-              <a:endParaRPr lang="en-IN" sz="1400" b="1" dirty="0">
-                <a:latin typeface="Roboto" panose="02000000000000000000" pitchFamily="2" charset="0"/>
-                <a:ea typeface="Roboto" panose="02000000000000000000" pitchFamily="2" charset="0"/>
-              </a:endParaRPr>
-            </a:p>
-          </p:txBody>
-        </p:sp>
-        <p:sp>
-          <p:nvSpPr>
-            <p:cNvPr id="43" name="Oval 42">
-              <a:extLst>
-                <a:ext uri="{FF2B5EF4-FFF2-40B4-BE49-F238E27FC236}">
-                  <a16:creationId xmlns:a16="http://schemas.microsoft.com/office/drawing/2014/main" id="{B05A025A-37F1-4B84-BC26-74EFA722E70B}"/>
-                </a:ext>
-              </a:extLst>
-            </p:cNvPr>
-            <p:cNvSpPr/>
-            <p:nvPr/>
-          </p:nvSpPr>
-          <p:spPr>
-            <a:xfrm>
-              <a:off x="3348653" y="4024050"/>
-              <a:ext cx="323386" cy="323386"/>
-            </a:xfrm>
-            <a:prstGeom prst="ellipse">
-              <a:avLst/>
-            </a:prstGeom>
-            <a:solidFill>
-              <a:schemeClr val="tx1"/>
-            </a:solidFill>
-            <a:ln>
-              <a:noFill/>
-            </a:ln>
-          </p:spPr>
-          <p:style>
-            <a:lnRef idx="2">
-              <a:schemeClr val="accent1">
-                <a:shade val="50000"/>
-              </a:schemeClr>
-            </a:lnRef>
-            <a:fillRef idx="1">
-              <a:schemeClr val="accent1"/>
-            </a:fillRef>
-            <a:effectRef idx="0">
-              <a:schemeClr val="accent1"/>
-            </a:effectRef>
-            <a:fontRef idx="minor">
-              <a:schemeClr val="lt1"/>
-            </a:fontRef>
-          </p:style>
-          <p:txBody>
-            <a:bodyPr rtlCol="0" anchor="ctr"/>
-            <a:lstStyle/>
-            <a:p>
-              <a:pPr algn="ctr"/>
-              <a:r>
-                <a:rPr lang="en-US" sz="1400" b="1" dirty="0">
-                  <a:latin typeface="Roboto" panose="02000000000000000000" pitchFamily="2" charset="0"/>
-                  <a:ea typeface="Roboto" panose="02000000000000000000" pitchFamily="2" charset="0"/>
-                </a:rPr>
-                <a:t>3</a:t>
-              </a:r>
-              <a:endParaRPr lang="en-IN" sz="1400" b="1" dirty="0">
-                <a:latin typeface="Roboto" panose="02000000000000000000" pitchFamily="2" charset="0"/>
-                <a:ea typeface="Roboto" panose="02000000000000000000" pitchFamily="2" charset="0"/>
-              </a:endParaRPr>
-            </a:p>
-          </p:txBody>
-        </p:sp>
-        <p:sp>
-          <p:nvSpPr>
-            <p:cNvPr id="44" name="Oval 43">
-              <a:extLst>
-                <a:ext uri="{FF2B5EF4-FFF2-40B4-BE49-F238E27FC236}">
-                  <a16:creationId xmlns:a16="http://schemas.microsoft.com/office/drawing/2014/main" id="{CE1F2F03-EBCD-41BC-9C6A-0131C2116CD7}"/>
-                </a:ext>
-              </a:extLst>
-            </p:cNvPr>
-            <p:cNvSpPr/>
-            <p:nvPr/>
-          </p:nvSpPr>
-          <p:spPr>
-            <a:xfrm>
-              <a:off x="3348653" y="3204435"/>
-              <a:ext cx="323386" cy="323386"/>
-            </a:xfrm>
-            <a:prstGeom prst="ellipse">
-              <a:avLst/>
-            </a:prstGeom>
-            <a:solidFill>
-              <a:schemeClr val="tx1"/>
-            </a:solidFill>
-            <a:ln>
-              <a:noFill/>
-            </a:ln>
-          </p:spPr>
-          <p:style>
-            <a:lnRef idx="2">
-              <a:schemeClr val="accent1">
-                <a:shade val="50000"/>
-              </a:schemeClr>
-            </a:lnRef>
-            <a:fillRef idx="1">
-              <a:schemeClr val="accent1"/>
-            </a:fillRef>
-            <a:effectRef idx="0">
-              <a:schemeClr val="accent1"/>
-            </a:effectRef>
-            <a:fontRef idx="minor">
-              <a:schemeClr val="lt1"/>
-            </a:fontRef>
-          </p:style>
-          <p:txBody>
-            <a:bodyPr rtlCol="0" anchor="ctr"/>
-            <a:lstStyle/>
-            <a:p>
-              <a:pPr algn="ctr"/>
-              <a:r>
-                <a:rPr lang="en-US" sz="1400" b="1" dirty="0">
-                  <a:latin typeface="Roboto" panose="02000000000000000000" pitchFamily="2" charset="0"/>
-                  <a:ea typeface="Roboto" panose="02000000000000000000" pitchFamily="2" charset="0"/>
-                </a:rPr>
-                <a:t>3</a:t>
-              </a:r>
-              <a:endParaRPr lang="en-IN" sz="1400" b="1" dirty="0">
-                <a:latin typeface="Roboto" panose="02000000000000000000" pitchFamily="2" charset="0"/>
-                <a:ea typeface="Roboto" panose="02000000000000000000" pitchFamily="2" charset="0"/>
-              </a:endParaRPr>
-            </a:p>
-          </p:txBody>
-        </p:sp>
-        <p:sp>
-          <p:nvSpPr>
-            <p:cNvPr id="45" name="Oval 44">
-              <a:extLst>
-                <a:ext uri="{FF2B5EF4-FFF2-40B4-BE49-F238E27FC236}">
-                  <a16:creationId xmlns:a16="http://schemas.microsoft.com/office/drawing/2014/main" id="{58FF4B9C-5E1C-4F20-8754-FF4D920AB2FC}"/>
-                </a:ext>
-              </a:extLst>
-            </p:cNvPr>
-            <p:cNvSpPr/>
-            <p:nvPr/>
-          </p:nvSpPr>
-          <p:spPr>
-            <a:xfrm>
-              <a:off x="6623824" y="1724316"/>
-              <a:ext cx="323386" cy="323386"/>
-            </a:xfrm>
-            <a:prstGeom prst="ellipse">
-              <a:avLst/>
-            </a:prstGeom>
-            <a:solidFill>
-              <a:schemeClr val="tx1"/>
-            </a:solidFill>
-            <a:ln>
-              <a:noFill/>
-            </a:ln>
-          </p:spPr>
-          <p:style>
-            <a:lnRef idx="2">
-              <a:schemeClr val="accent1">
-                <a:shade val="50000"/>
-              </a:schemeClr>
-            </a:lnRef>
-            <a:fillRef idx="1">
-              <a:schemeClr val="accent1"/>
-            </a:fillRef>
-            <a:effectRef idx="0">
-              <a:schemeClr val="accent1"/>
-            </a:effectRef>
-            <a:fontRef idx="minor">
-              <a:schemeClr val="lt1"/>
-            </a:fontRef>
-          </p:style>
-          <p:txBody>
-            <a:bodyPr rtlCol="0" anchor="ctr"/>
-            <a:lstStyle/>
-            <a:p>
-              <a:pPr algn="ctr"/>
-              <a:r>
-                <a:rPr lang="en-US" sz="1400" b="1" dirty="0">
-                  <a:latin typeface="Roboto" panose="02000000000000000000" pitchFamily="2" charset="0"/>
-                  <a:ea typeface="Roboto" panose="02000000000000000000" pitchFamily="2" charset="0"/>
-                </a:rPr>
-                <a:t>4</a:t>
-              </a:r>
-              <a:endParaRPr lang="en-IN" sz="1400" b="1" dirty="0">
-                <a:latin typeface="Roboto" panose="02000000000000000000" pitchFamily="2" charset="0"/>
-                <a:ea typeface="Roboto" panose="02000000000000000000" pitchFamily="2" charset="0"/>
-              </a:endParaRPr>
-            </a:p>
-          </p:txBody>
-        </p:sp>
-        <p:sp>
-          <p:nvSpPr>
-            <p:cNvPr id="46" name="Oval 45">
-              <a:extLst>
-                <a:ext uri="{FF2B5EF4-FFF2-40B4-BE49-F238E27FC236}">
-                  <a16:creationId xmlns:a16="http://schemas.microsoft.com/office/drawing/2014/main" id="{EF414D09-DA58-4CB0-A7D2-6BF41C4799EA}"/>
-                </a:ext>
-              </a:extLst>
-            </p:cNvPr>
-            <p:cNvSpPr/>
-            <p:nvPr/>
-          </p:nvSpPr>
-          <p:spPr>
-            <a:xfrm>
-              <a:off x="9132850" y="3170457"/>
-              <a:ext cx="323386" cy="323386"/>
-            </a:xfrm>
-            <a:prstGeom prst="ellipse">
-              <a:avLst/>
-            </a:prstGeom>
-            <a:solidFill>
-              <a:schemeClr val="tx1"/>
-            </a:solidFill>
-            <a:ln>
-              <a:noFill/>
-            </a:ln>
-          </p:spPr>
-          <p:style>
-            <a:lnRef idx="2">
-              <a:schemeClr val="accent1">
-                <a:shade val="50000"/>
-              </a:schemeClr>
-            </a:lnRef>
-            <a:fillRef idx="1">
-              <a:schemeClr val="accent1"/>
-            </a:fillRef>
-            <a:effectRef idx="0">
-              <a:schemeClr val="accent1"/>
-            </a:effectRef>
-            <a:fontRef idx="minor">
-              <a:schemeClr val="lt1"/>
-            </a:fontRef>
-          </p:style>
-          <p:txBody>
-            <a:bodyPr rtlCol="0" anchor="ctr"/>
-            <a:lstStyle/>
-            <a:p>
-              <a:pPr algn="ctr"/>
-              <a:r>
-                <a:rPr lang="en-US" sz="1400" b="1" dirty="0">
-                  <a:latin typeface="Roboto" panose="02000000000000000000" pitchFamily="2" charset="0"/>
-                  <a:ea typeface="Roboto" panose="02000000000000000000" pitchFamily="2" charset="0"/>
-                </a:rPr>
-                <a:t>1</a:t>
-              </a:r>
-              <a:endParaRPr lang="en-IN" sz="1400" b="1" dirty="0">
-                <a:latin typeface="Roboto" panose="02000000000000000000" pitchFamily="2" charset="0"/>
-                <a:ea typeface="Roboto" panose="02000000000000000000" pitchFamily="2" charset="0"/>
-              </a:endParaRPr>
-            </a:p>
-          </p:txBody>
-        </p:sp>
-        <p:sp>
-          <p:nvSpPr>
-            <p:cNvPr id="47" name="TextBox 46">
-              <a:extLst>
-                <a:ext uri="{FF2B5EF4-FFF2-40B4-BE49-F238E27FC236}">
-                  <a16:creationId xmlns:a16="http://schemas.microsoft.com/office/drawing/2014/main" id="{FA13CEB3-BD26-4A65-8F5D-D1081C6AA772}"/>
-                </a:ext>
-              </a:extLst>
-            </p:cNvPr>
-            <p:cNvSpPr txBox="1"/>
-            <p:nvPr/>
-          </p:nvSpPr>
-          <p:spPr>
-            <a:xfrm>
-              <a:off x="1309267" y="4631099"/>
-              <a:ext cx="2676293" cy="369332"/>
-            </a:xfrm>
-            <a:prstGeom prst="rect">
-              <a:avLst/>
-            </a:prstGeom>
-            <a:noFill/>
-          </p:spPr>
-          <p:txBody>
-            <a:bodyPr wrap="square" rtlCol="0">
-              <a:spAutoFit/>
-            </a:bodyPr>
-            <a:lstStyle/>
-            <a:p>
-              <a:pPr algn="ctr"/>
-              <a:r>
-                <a:rPr lang="en-US" b="1" dirty="0">
-                  <a:latin typeface="Roboto" panose="02000000000000000000" pitchFamily="2" charset="0"/>
-                  <a:ea typeface="Roboto" panose="02000000000000000000" pitchFamily="2" charset="0"/>
-                </a:rPr>
-                <a:t>Customer</a:t>
-              </a:r>
-              <a:endParaRPr lang="en-IN" b="1" dirty="0">
-                <a:latin typeface="Roboto" panose="02000000000000000000" pitchFamily="2" charset="0"/>
-                <a:ea typeface="Roboto" panose="02000000000000000000" pitchFamily="2" charset="0"/>
-              </a:endParaRPr>
-            </a:p>
-          </p:txBody>
-        </p:sp>
-        <p:sp>
-          <p:nvSpPr>
-            <p:cNvPr id="48" name="TextBox 47">
-              <a:extLst>
-                <a:ext uri="{FF2B5EF4-FFF2-40B4-BE49-F238E27FC236}">
-                  <a16:creationId xmlns:a16="http://schemas.microsoft.com/office/drawing/2014/main" id="{580EA7C9-8DFB-43AB-8DFE-7B4588C74203}"/>
-                </a:ext>
-              </a:extLst>
-            </p:cNvPr>
-            <p:cNvSpPr txBox="1"/>
-            <p:nvPr/>
-          </p:nvSpPr>
-          <p:spPr>
-            <a:xfrm>
-              <a:off x="7477894" y="4631099"/>
-              <a:ext cx="2676293" cy="369332"/>
-            </a:xfrm>
-            <a:prstGeom prst="rect">
-              <a:avLst/>
-            </a:prstGeom>
-            <a:noFill/>
-          </p:spPr>
-          <p:txBody>
-            <a:bodyPr wrap="square" rtlCol="0">
-              <a:spAutoFit/>
-            </a:bodyPr>
-            <a:lstStyle/>
-            <a:p>
-              <a:pPr algn="ctr"/>
-              <a:r>
-                <a:rPr lang="en-US" b="1" dirty="0">
-                  <a:latin typeface="Roboto" panose="02000000000000000000" pitchFamily="2" charset="0"/>
-                  <a:ea typeface="Roboto" panose="02000000000000000000" pitchFamily="2" charset="0"/>
-                </a:rPr>
-                <a:t>Restaurant</a:t>
-              </a:r>
-              <a:endParaRPr lang="en-IN" b="1" dirty="0">
-                <a:latin typeface="Roboto" panose="02000000000000000000" pitchFamily="2" charset="0"/>
-                <a:ea typeface="Roboto" panose="02000000000000000000" pitchFamily="2" charset="0"/>
-              </a:endParaRPr>
-            </a:p>
-          </p:txBody>
-        </p:sp>
-        <p:sp>
-          <p:nvSpPr>
-            <p:cNvPr id="16" name="Freeform 222">
-              <a:extLst>
-                <a:ext uri="{FF2B5EF4-FFF2-40B4-BE49-F238E27FC236}">
-                  <a16:creationId xmlns:a16="http://schemas.microsoft.com/office/drawing/2014/main" id="{4293A54A-24BE-4517-9E93-63D20070BA94}"/>
-                </a:ext>
-              </a:extLst>
-            </p:cNvPr>
-            <p:cNvSpPr>
-              <a:spLocks noEditPoints="1"/>
-            </p:cNvSpPr>
-            <p:nvPr/>
-          </p:nvSpPr>
-          <p:spPr bwMode="auto">
-            <a:xfrm>
-              <a:off x="2274848" y="3332150"/>
-              <a:ext cx="633619" cy="1093749"/>
-            </a:xfrm>
-            <a:custGeom>
-              <a:avLst/>
-              <a:gdLst>
-                <a:gd name="T0" fmla="*/ 2147483646 w 39"/>
-                <a:gd name="T1" fmla="*/ 2147483646 h 67"/>
-                <a:gd name="T2" fmla="*/ 2147483646 w 39"/>
-                <a:gd name="T3" fmla="*/ 2147483646 h 67"/>
-                <a:gd name="T4" fmla="*/ 2147483646 w 39"/>
-                <a:gd name="T5" fmla="*/ 2147483646 h 67"/>
-                <a:gd name="T6" fmla="*/ 2147483646 w 39"/>
-                <a:gd name="T7" fmla="*/ 2147483646 h 67"/>
-                <a:gd name="T8" fmla="*/ 2147483646 w 39"/>
-                <a:gd name="T9" fmla="*/ 2147483646 h 67"/>
-                <a:gd name="T10" fmla="*/ 2147483646 w 39"/>
-                <a:gd name="T11" fmla="*/ 2147483646 h 67"/>
-                <a:gd name="T12" fmla="*/ 2147483646 w 39"/>
-                <a:gd name="T13" fmla="*/ 2147483646 h 67"/>
-                <a:gd name="T14" fmla="*/ 2147483646 w 39"/>
-                <a:gd name="T15" fmla="*/ 2147483646 h 67"/>
-                <a:gd name="T16" fmla="*/ 2147483646 w 39"/>
-                <a:gd name="T17" fmla="*/ 2147483646 h 67"/>
-                <a:gd name="T18" fmla="*/ 2147483646 w 39"/>
-                <a:gd name="T19" fmla="*/ 2147483646 h 67"/>
-                <a:gd name="T20" fmla="*/ 2147483646 w 39"/>
-                <a:gd name="T21" fmla="*/ 2147483646 h 67"/>
-                <a:gd name="T22" fmla="*/ 2147483646 w 39"/>
-                <a:gd name="T23" fmla="*/ 2147483646 h 67"/>
-                <a:gd name="T24" fmla="*/ 2147483646 w 39"/>
-                <a:gd name="T25" fmla="*/ 2147483646 h 67"/>
-                <a:gd name="T26" fmla="*/ 2147483646 w 39"/>
-                <a:gd name="T27" fmla="*/ 2147483646 h 67"/>
-                <a:gd name="T28" fmla="*/ 2147483646 w 39"/>
-                <a:gd name="T29" fmla="*/ 2147483646 h 67"/>
-                <a:gd name="T30" fmla="*/ 2147483646 w 39"/>
-                <a:gd name="T31" fmla="*/ 2147483646 h 67"/>
-                <a:gd name="T32" fmla="*/ 2147483646 w 39"/>
-                <a:gd name="T33" fmla="*/ 2147483646 h 67"/>
-                <a:gd name="T34" fmla="*/ 0 w 39"/>
-                <a:gd name="T35" fmla="*/ 2147483646 h 67"/>
-                <a:gd name="T36" fmla="*/ 0 w 39"/>
-                <a:gd name="T37" fmla="*/ 2147483646 h 67"/>
-                <a:gd name="T38" fmla="*/ 2147483646 w 39"/>
-                <a:gd name="T39" fmla="*/ 2147483646 h 67"/>
-                <a:gd name="T40" fmla="*/ 2147483646 w 39"/>
-                <a:gd name="T41" fmla="*/ 2147483646 h 67"/>
-                <a:gd name="T42" fmla="*/ 2147483646 w 39"/>
-                <a:gd name="T43" fmla="*/ 2147483646 h 67"/>
-                <a:gd name="T44" fmla="*/ 2147483646 w 39"/>
-                <a:gd name="T45" fmla="*/ 2147483646 h 67"/>
-                <a:gd name="T46" fmla="*/ 2147483646 w 39"/>
-                <a:gd name="T47" fmla="*/ 2147483646 h 67"/>
-                <a:gd name="T48" fmla="*/ 2147483646 w 39"/>
-                <a:gd name="T49" fmla="*/ 2147483646 h 67"/>
-                <a:gd name="T50" fmla="*/ 2147483646 w 39"/>
-                <a:gd name="T51" fmla="*/ 0 h 67"/>
-                <a:gd name="T52" fmla="*/ 2147483646 w 39"/>
-                <a:gd name="T53" fmla="*/ 2147483646 h 67"/>
-                <a:gd name="T54" fmla="*/ 2147483646 w 39"/>
-                <a:gd name="T55" fmla="*/ 2147483646 h 67"/>
-                <a:gd name="T56" fmla="*/ 0 60000 65536"/>
-                <a:gd name="T57" fmla="*/ 0 60000 65536"/>
-                <a:gd name="T58" fmla="*/ 0 60000 65536"/>
-                <a:gd name="T59" fmla="*/ 0 60000 65536"/>
-                <a:gd name="T60" fmla="*/ 0 60000 65536"/>
-                <a:gd name="T61" fmla="*/ 0 60000 65536"/>
-                <a:gd name="T62" fmla="*/ 0 60000 65536"/>
-                <a:gd name="T63" fmla="*/ 0 60000 65536"/>
-                <a:gd name="T64" fmla="*/ 0 60000 65536"/>
-                <a:gd name="T65" fmla="*/ 0 60000 65536"/>
-                <a:gd name="T66" fmla="*/ 0 60000 65536"/>
-                <a:gd name="T67" fmla="*/ 0 60000 65536"/>
-                <a:gd name="T68" fmla="*/ 0 60000 65536"/>
-                <a:gd name="T69" fmla="*/ 0 60000 65536"/>
-                <a:gd name="T70" fmla="*/ 0 60000 65536"/>
-                <a:gd name="T71" fmla="*/ 0 60000 65536"/>
-                <a:gd name="T72" fmla="*/ 0 60000 65536"/>
-                <a:gd name="T73" fmla="*/ 0 60000 65536"/>
-                <a:gd name="T74" fmla="*/ 0 60000 65536"/>
-                <a:gd name="T75" fmla="*/ 0 60000 65536"/>
-                <a:gd name="T76" fmla="*/ 0 60000 65536"/>
-                <a:gd name="T77" fmla="*/ 0 60000 65536"/>
-                <a:gd name="T78" fmla="*/ 0 60000 65536"/>
-                <a:gd name="T79" fmla="*/ 0 60000 65536"/>
-                <a:gd name="T80" fmla="*/ 0 60000 65536"/>
-                <a:gd name="T81" fmla="*/ 0 60000 65536"/>
-                <a:gd name="T82" fmla="*/ 0 60000 65536"/>
-                <a:gd name="T83" fmla="*/ 0 60000 65536"/>
-              </a:gdLst>
-              <a:ahLst/>
-              <a:cxnLst>
-                <a:cxn ang="T56">
-                  <a:pos x="T0" y="T1"/>
-                </a:cxn>
-                <a:cxn ang="T57">
-                  <a:pos x="T2" y="T3"/>
-                </a:cxn>
-                <a:cxn ang="T58">
-                  <a:pos x="T4" y="T5"/>
-                </a:cxn>
-                <a:cxn ang="T59">
-                  <a:pos x="T6" y="T7"/>
-                </a:cxn>
-                <a:cxn ang="T60">
-                  <a:pos x="T8" y="T9"/>
-                </a:cxn>
-                <a:cxn ang="T61">
-                  <a:pos x="T10" y="T11"/>
-                </a:cxn>
-                <a:cxn ang="T62">
-                  <a:pos x="T12" y="T13"/>
-                </a:cxn>
-                <a:cxn ang="T63">
-                  <a:pos x="T14" y="T15"/>
-                </a:cxn>
-                <a:cxn ang="T64">
-                  <a:pos x="T16" y="T17"/>
-                </a:cxn>
-                <a:cxn ang="T65">
-                  <a:pos x="T18" y="T19"/>
-                </a:cxn>
-                <a:cxn ang="T66">
-                  <a:pos x="T20" y="T21"/>
-                </a:cxn>
-                <a:cxn ang="T67">
-                  <a:pos x="T22" y="T23"/>
-                </a:cxn>
-                <a:cxn ang="T68">
-                  <a:pos x="T24" y="T25"/>
-                </a:cxn>
-                <a:cxn ang="T69">
-                  <a:pos x="T26" y="T27"/>
-                </a:cxn>
-                <a:cxn ang="T70">
-                  <a:pos x="T28" y="T29"/>
-                </a:cxn>
-                <a:cxn ang="T71">
-                  <a:pos x="T30" y="T31"/>
-                </a:cxn>
-                <a:cxn ang="T72">
-                  <a:pos x="T32" y="T33"/>
-                </a:cxn>
-                <a:cxn ang="T73">
-                  <a:pos x="T34" y="T35"/>
-                </a:cxn>
-                <a:cxn ang="T74">
-                  <a:pos x="T36" y="T37"/>
-                </a:cxn>
-                <a:cxn ang="T75">
-                  <a:pos x="T38" y="T39"/>
-                </a:cxn>
-                <a:cxn ang="T76">
-                  <a:pos x="T40" y="T41"/>
-                </a:cxn>
-                <a:cxn ang="T77">
-                  <a:pos x="T42" y="T43"/>
-                </a:cxn>
-                <a:cxn ang="T78">
-                  <a:pos x="T44" y="T45"/>
-                </a:cxn>
-                <a:cxn ang="T79">
-                  <a:pos x="T46" y="T47"/>
-                </a:cxn>
-                <a:cxn ang="T80">
-                  <a:pos x="T48" y="T49"/>
-                </a:cxn>
-                <a:cxn ang="T81">
-                  <a:pos x="T50" y="T51"/>
-                </a:cxn>
-                <a:cxn ang="T82">
-                  <a:pos x="T52" y="T53"/>
-                </a:cxn>
-                <a:cxn ang="T83">
-                  <a:pos x="T54" y="T55"/>
-                </a:cxn>
-              </a:cxnLst>
-              <a:rect l="0" t="0" r="r" b="b"/>
-              <a:pathLst>
-                <a:path w="39" h="67">
-                  <a:moveTo>
-                    <a:pt x="39" y="41"/>
-                  </a:moveTo>
-                  <a:cubicBezTo>
-                    <a:pt x="39" y="43"/>
-                    <a:pt x="37" y="45"/>
-                    <a:pt x="35" y="45"/>
-                  </a:cubicBezTo>
-                  <a:cubicBezTo>
-                    <a:pt x="33" y="45"/>
-                    <a:pt x="31" y="43"/>
-                    <a:pt x="31" y="41"/>
-                  </a:cubicBezTo>
-                  <a:cubicBezTo>
-                    <a:pt x="31" y="28"/>
-                    <a:pt x="31" y="28"/>
-                    <a:pt x="31" y="28"/>
-                  </a:cubicBezTo>
-                  <a:cubicBezTo>
-                    <a:pt x="29" y="28"/>
-                    <a:pt x="29" y="28"/>
-                    <a:pt x="29" y="28"/>
-                  </a:cubicBezTo>
-                  <a:cubicBezTo>
-                    <a:pt x="29" y="62"/>
-                    <a:pt x="29" y="62"/>
-                    <a:pt x="29" y="62"/>
-                  </a:cubicBezTo>
-                  <a:cubicBezTo>
-                    <a:pt x="29" y="65"/>
-                    <a:pt x="27" y="67"/>
-                    <a:pt x="25" y="67"/>
-                  </a:cubicBezTo>
-                  <a:cubicBezTo>
-                    <a:pt x="22" y="67"/>
-                    <a:pt x="20" y="65"/>
-                    <a:pt x="20" y="62"/>
-                  </a:cubicBezTo>
-                  <a:cubicBezTo>
-                    <a:pt x="20" y="45"/>
-                    <a:pt x="20" y="45"/>
-                    <a:pt x="20" y="45"/>
-                  </a:cubicBezTo>
-                  <a:cubicBezTo>
-                    <a:pt x="18" y="45"/>
-                    <a:pt x="18" y="45"/>
-                    <a:pt x="18" y="45"/>
-                  </a:cubicBezTo>
-                  <a:cubicBezTo>
-                    <a:pt x="18" y="62"/>
-                    <a:pt x="18" y="62"/>
-                    <a:pt x="18" y="62"/>
-                  </a:cubicBezTo>
-                  <a:cubicBezTo>
-                    <a:pt x="18" y="65"/>
-                    <a:pt x="16" y="67"/>
-                    <a:pt x="14" y="67"/>
-                  </a:cubicBezTo>
-                  <a:cubicBezTo>
-                    <a:pt x="11" y="67"/>
-                    <a:pt x="9" y="65"/>
-                    <a:pt x="9" y="62"/>
-                  </a:cubicBezTo>
-                  <a:cubicBezTo>
-                    <a:pt x="9" y="28"/>
-                    <a:pt x="9" y="28"/>
-                    <a:pt x="9" y="28"/>
-                  </a:cubicBezTo>
-                  <a:cubicBezTo>
-                    <a:pt x="7" y="28"/>
-                    <a:pt x="7" y="28"/>
-                    <a:pt x="7" y="28"/>
-                  </a:cubicBezTo>
-                  <a:cubicBezTo>
-                    <a:pt x="7" y="41"/>
-                    <a:pt x="7" y="41"/>
-                    <a:pt x="7" y="41"/>
-                  </a:cubicBezTo>
-                  <a:cubicBezTo>
-                    <a:pt x="7" y="43"/>
-                    <a:pt x="5" y="45"/>
-                    <a:pt x="3" y="45"/>
-                  </a:cubicBezTo>
-                  <a:cubicBezTo>
-                    <a:pt x="1" y="45"/>
-                    <a:pt x="0" y="43"/>
-                    <a:pt x="0" y="41"/>
-                  </a:cubicBezTo>
-                  <a:cubicBezTo>
-                    <a:pt x="0" y="25"/>
-                    <a:pt x="0" y="25"/>
-                    <a:pt x="0" y="25"/>
-                  </a:cubicBezTo>
-                  <a:cubicBezTo>
-                    <a:pt x="0" y="21"/>
-                    <a:pt x="3" y="18"/>
-                    <a:pt x="7" y="18"/>
-                  </a:cubicBezTo>
-                  <a:cubicBezTo>
-                    <a:pt x="31" y="18"/>
-                    <a:pt x="31" y="18"/>
-                    <a:pt x="31" y="18"/>
-                  </a:cubicBezTo>
-                  <a:cubicBezTo>
-                    <a:pt x="35" y="18"/>
-                    <a:pt x="39" y="21"/>
-                    <a:pt x="39" y="25"/>
-                  </a:cubicBezTo>
-                  <a:lnTo>
-                    <a:pt x="39" y="41"/>
-                  </a:lnTo>
-                  <a:close/>
-                  <a:moveTo>
-                    <a:pt x="19" y="17"/>
-                  </a:moveTo>
-                  <a:cubicBezTo>
-                    <a:pt x="14" y="17"/>
-                    <a:pt x="11" y="13"/>
-                    <a:pt x="11" y="8"/>
-                  </a:cubicBezTo>
-                  <a:cubicBezTo>
-                    <a:pt x="11" y="4"/>
-                    <a:pt x="14" y="0"/>
-                    <a:pt x="19" y="0"/>
-                  </a:cubicBezTo>
-                  <a:cubicBezTo>
-                    <a:pt x="24" y="0"/>
-                    <a:pt x="28" y="4"/>
-                    <a:pt x="28" y="8"/>
-                  </a:cubicBezTo>
-                  <a:cubicBezTo>
-                    <a:pt x="28" y="13"/>
-                    <a:pt x="24" y="17"/>
-                    <a:pt x="19" y="17"/>
-                  </a:cubicBezTo>
-                  <a:close/>
-                </a:path>
-              </a:pathLst>
-            </a:custGeom>
-            <a:solidFill>
-              <a:schemeClr val="tx1">
-                <a:lumMod val="65000"/>
-                <a:lumOff val="35000"/>
-              </a:schemeClr>
-            </a:solidFill>
-            <a:ln>
-              <a:noFill/>
-            </a:ln>
-          </p:spPr>
-          <p:txBody>
-            <a:bodyPr/>
-            <a:lstStyle/>
-            <a:p>
-              <a:endParaRPr lang="en-IN">
-                <a:latin typeface="Roboto" panose="02000000000000000000" pitchFamily="2" charset="0"/>
-                <a:ea typeface="Roboto" panose="02000000000000000000" pitchFamily="2" charset="0"/>
-              </a:endParaRPr>
-            </a:p>
-          </p:txBody>
-        </p:sp>
-        <p:sp>
-          <p:nvSpPr>
-            <p:cNvPr id="17" name="Freeform 222">
-              <a:extLst>
-                <a:ext uri="{FF2B5EF4-FFF2-40B4-BE49-F238E27FC236}">
-                  <a16:creationId xmlns:a16="http://schemas.microsoft.com/office/drawing/2014/main" id="{D5B48E6A-C455-45DA-82F1-9322E69DCDC6}"/>
-                </a:ext>
-              </a:extLst>
-            </p:cNvPr>
-            <p:cNvSpPr>
-              <a:spLocks noEditPoints="1"/>
-            </p:cNvSpPr>
-            <p:nvPr/>
-          </p:nvSpPr>
-          <p:spPr bwMode="auto">
-            <a:xfrm>
-              <a:off x="8499231" y="3332150"/>
-              <a:ext cx="633619" cy="1093749"/>
-            </a:xfrm>
-            <a:custGeom>
-              <a:avLst/>
-              <a:gdLst>
-                <a:gd name="T0" fmla="*/ 2147483646 w 39"/>
-                <a:gd name="T1" fmla="*/ 2147483646 h 67"/>
-                <a:gd name="T2" fmla="*/ 2147483646 w 39"/>
-                <a:gd name="T3" fmla="*/ 2147483646 h 67"/>
-                <a:gd name="T4" fmla="*/ 2147483646 w 39"/>
-                <a:gd name="T5" fmla="*/ 2147483646 h 67"/>
-                <a:gd name="T6" fmla="*/ 2147483646 w 39"/>
-                <a:gd name="T7" fmla="*/ 2147483646 h 67"/>
-                <a:gd name="T8" fmla="*/ 2147483646 w 39"/>
-                <a:gd name="T9" fmla="*/ 2147483646 h 67"/>
-                <a:gd name="T10" fmla="*/ 2147483646 w 39"/>
-                <a:gd name="T11" fmla="*/ 2147483646 h 67"/>
-                <a:gd name="T12" fmla="*/ 2147483646 w 39"/>
-                <a:gd name="T13" fmla="*/ 2147483646 h 67"/>
-                <a:gd name="T14" fmla="*/ 2147483646 w 39"/>
-                <a:gd name="T15" fmla="*/ 2147483646 h 67"/>
-                <a:gd name="T16" fmla="*/ 2147483646 w 39"/>
-                <a:gd name="T17" fmla="*/ 2147483646 h 67"/>
-                <a:gd name="T18" fmla="*/ 2147483646 w 39"/>
-                <a:gd name="T19" fmla="*/ 2147483646 h 67"/>
-                <a:gd name="T20" fmla="*/ 2147483646 w 39"/>
-                <a:gd name="T21" fmla="*/ 2147483646 h 67"/>
-                <a:gd name="T22" fmla="*/ 2147483646 w 39"/>
-                <a:gd name="T23" fmla="*/ 2147483646 h 67"/>
-                <a:gd name="T24" fmla="*/ 2147483646 w 39"/>
-                <a:gd name="T25" fmla="*/ 2147483646 h 67"/>
-                <a:gd name="T26" fmla="*/ 2147483646 w 39"/>
-                <a:gd name="T27" fmla="*/ 2147483646 h 67"/>
-                <a:gd name="T28" fmla="*/ 2147483646 w 39"/>
-                <a:gd name="T29" fmla="*/ 2147483646 h 67"/>
-                <a:gd name="T30" fmla="*/ 2147483646 w 39"/>
-                <a:gd name="T31" fmla="*/ 2147483646 h 67"/>
-                <a:gd name="T32" fmla="*/ 2147483646 w 39"/>
-                <a:gd name="T33" fmla="*/ 2147483646 h 67"/>
-                <a:gd name="T34" fmla="*/ 0 w 39"/>
-                <a:gd name="T35" fmla="*/ 2147483646 h 67"/>
-                <a:gd name="T36" fmla="*/ 0 w 39"/>
-                <a:gd name="T37" fmla="*/ 2147483646 h 67"/>
-                <a:gd name="T38" fmla="*/ 2147483646 w 39"/>
-                <a:gd name="T39" fmla="*/ 2147483646 h 67"/>
-                <a:gd name="T40" fmla="*/ 2147483646 w 39"/>
-                <a:gd name="T41" fmla="*/ 2147483646 h 67"/>
-                <a:gd name="T42" fmla="*/ 2147483646 w 39"/>
-                <a:gd name="T43" fmla="*/ 2147483646 h 67"/>
-                <a:gd name="T44" fmla="*/ 2147483646 w 39"/>
-                <a:gd name="T45" fmla="*/ 2147483646 h 67"/>
-                <a:gd name="T46" fmla="*/ 2147483646 w 39"/>
-                <a:gd name="T47" fmla="*/ 2147483646 h 67"/>
-                <a:gd name="T48" fmla="*/ 2147483646 w 39"/>
-                <a:gd name="T49" fmla="*/ 2147483646 h 67"/>
-                <a:gd name="T50" fmla="*/ 2147483646 w 39"/>
-                <a:gd name="T51" fmla="*/ 0 h 67"/>
-                <a:gd name="T52" fmla="*/ 2147483646 w 39"/>
-                <a:gd name="T53" fmla="*/ 2147483646 h 67"/>
-                <a:gd name="T54" fmla="*/ 2147483646 w 39"/>
-                <a:gd name="T55" fmla="*/ 2147483646 h 67"/>
-                <a:gd name="T56" fmla="*/ 0 60000 65536"/>
-                <a:gd name="T57" fmla="*/ 0 60000 65536"/>
-                <a:gd name="T58" fmla="*/ 0 60000 65536"/>
-                <a:gd name="T59" fmla="*/ 0 60000 65536"/>
-                <a:gd name="T60" fmla="*/ 0 60000 65536"/>
-                <a:gd name="T61" fmla="*/ 0 60000 65536"/>
-                <a:gd name="T62" fmla="*/ 0 60000 65536"/>
-                <a:gd name="T63" fmla="*/ 0 60000 65536"/>
-                <a:gd name="T64" fmla="*/ 0 60000 65536"/>
-                <a:gd name="T65" fmla="*/ 0 60000 65536"/>
-                <a:gd name="T66" fmla="*/ 0 60000 65536"/>
-                <a:gd name="T67" fmla="*/ 0 60000 65536"/>
-                <a:gd name="T68" fmla="*/ 0 60000 65536"/>
-                <a:gd name="T69" fmla="*/ 0 60000 65536"/>
-                <a:gd name="T70" fmla="*/ 0 60000 65536"/>
-                <a:gd name="T71" fmla="*/ 0 60000 65536"/>
-                <a:gd name="T72" fmla="*/ 0 60000 65536"/>
-                <a:gd name="T73" fmla="*/ 0 60000 65536"/>
-                <a:gd name="T74" fmla="*/ 0 60000 65536"/>
-                <a:gd name="T75" fmla="*/ 0 60000 65536"/>
-                <a:gd name="T76" fmla="*/ 0 60000 65536"/>
-                <a:gd name="T77" fmla="*/ 0 60000 65536"/>
-                <a:gd name="T78" fmla="*/ 0 60000 65536"/>
-                <a:gd name="T79" fmla="*/ 0 60000 65536"/>
-                <a:gd name="T80" fmla="*/ 0 60000 65536"/>
-                <a:gd name="T81" fmla="*/ 0 60000 65536"/>
-                <a:gd name="T82" fmla="*/ 0 60000 65536"/>
-                <a:gd name="T83" fmla="*/ 0 60000 65536"/>
-              </a:gdLst>
-              <a:ahLst/>
-              <a:cxnLst>
-                <a:cxn ang="T56">
-                  <a:pos x="T0" y="T1"/>
-                </a:cxn>
-                <a:cxn ang="T57">
-                  <a:pos x="T2" y="T3"/>
-                </a:cxn>
-                <a:cxn ang="T58">
-                  <a:pos x="T4" y="T5"/>
-                </a:cxn>
-                <a:cxn ang="T59">
-                  <a:pos x="T6" y="T7"/>
-                </a:cxn>
-                <a:cxn ang="T60">
-                  <a:pos x="T8" y="T9"/>
-                </a:cxn>
-                <a:cxn ang="T61">
-                  <a:pos x="T10" y="T11"/>
-                </a:cxn>
-                <a:cxn ang="T62">
-                  <a:pos x="T12" y="T13"/>
-                </a:cxn>
-                <a:cxn ang="T63">
-                  <a:pos x="T14" y="T15"/>
-                </a:cxn>
-                <a:cxn ang="T64">
-                  <a:pos x="T16" y="T17"/>
-                </a:cxn>
-                <a:cxn ang="T65">
-                  <a:pos x="T18" y="T19"/>
-                </a:cxn>
-                <a:cxn ang="T66">
-                  <a:pos x="T20" y="T21"/>
-                </a:cxn>
-                <a:cxn ang="T67">
-                  <a:pos x="T22" y="T23"/>
-                </a:cxn>
-                <a:cxn ang="T68">
-                  <a:pos x="T24" y="T25"/>
-                </a:cxn>
-                <a:cxn ang="T69">
-                  <a:pos x="T26" y="T27"/>
-                </a:cxn>
-                <a:cxn ang="T70">
-                  <a:pos x="T28" y="T29"/>
-                </a:cxn>
-                <a:cxn ang="T71">
-                  <a:pos x="T30" y="T31"/>
-                </a:cxn>
-                <a:cxn ang="T72">
-                  <a:pos x="T32" y="T33"/>
-                </a:cxn>
-                <a:cxn ang="T73">
-                  <a:pos x="T34" y="T35"/>
-                </a:cxn>
-                <a:cxn ang="T74">
-                  <a:pos x="T36" y="T37"/>
-                </a:cxn>
-                <a:cxn ang="T75">
-                  <a:pos x="T38" y="T39"/>
-                </a:cxn>
-                <a:cxn ang="T76">
-                  <a:pos x="T40" y="T41"/>
-                </a:cxn>
-                <a:cxn ang="T77">
-                  <a:pos x="T42" y="T43"/>
-                </a:cxn>
-                <a:cxn ang="T78">
-                  <a:pos x="T44" y="T45"/>
-                </a:cxn>
-                <a:cxn ang="T79">
-                  <a:pos x="T46" y="T47"/>
-                </a:cxn>
-                <a:cxn ang="T80">
-                  <a:pos x="T48" y="T49"/>
-                </a:cxn>
-                <a:cxn ang="T81">
-                  <a:pos x="T50" y="T51"/>
-                </a:cxn>
-                <a:cxn ang="T82">
-                  <a:pos x="T52" y="T53"/>
-                </a:cxn>
-                <a:cxn ang="T83">
-                  <a:pos x="T54" y="T55"/>
-                </a:cxn>
-              </a:cxnLst>
-              <a:rect l="0" t="0" r="r" b="b"/>
-              <a:pathLst>
-                <a:path w="39" h="67">
-                  <a:moveTo>
-                    <a:pt x="39" y="41"/>
-                  </a:moveTo>
-                  <a:cubicBezTo>
-                    <a:pt x="39" y="43"/>
-                    <a:pt x="37" y="45"/>
-                    <a:pt x="35" y="45"/>
-                  </a:cubicBezTo>
-                  <a:cubicBezTo>
-                    <a:pt x="33" y="45"/>
-                    <a:pt x="31" y="43"/>
-                    <a:pt x="31" y="41"/>
-                  </a:cubicBezTo>
-                  <a:cubicBezTo>
-                    <a:pt x="31" y="28"/>
-                    <a:pt x="31" y="28"/>
-                    <a:pt x="31" y="28"/>
-                  </a:cubicBezTo>
-                  <a:cubicBezTo>
-                    <a:pt x="29" y="28"/>
-                    <a:pt x="29" y="28"/>
-                    <a:pt x="29" y="28"/>
-                  </a:cubicBezTo>
-                  <a:cubicBezTo>
-                    <a:pt x="29" y="62"/>
-                    <a:pt x="29" y="62"/>
-                    <a:pt x="29" y="62"/>
-                  </a:cubicBezTo>
-                  <a:cubicBezTo>
-                    <a:pt x="29" y="65"/>
-                    <a:pt x="27" y="67"/>
-                    <a:pt x="25" y="67"/>
-                  </a:cubicBezTo>
-                  <a:cubicBezTo>
-                    <a:pt x="22" y="67"/>
-                    <a:pt x="20" y="65"/>
-                    <a:pt x="20" y="62"/>
-                  </a:cubicBezTo>
-                  <a:cubicBezTo>
-                    <a:pt x="20" y="45"/>
-                    <a:pt x="20" y="45"/>
-                    <a:pt x="20" y="45"/>
-                  </a:cubicBezTo>
-                  <a:cubicBezTo>
-                    <a:pt x="18" y="45"/>
-                    <a:pt x="18" y="45"/>
-                    <a:pt x="18" y="45"/>
-                  </a:cubicBezTo>
-                  <a:cubicBezTo>
-                    <a:pt x="18" y="62"/>
-                    <a:pt x="18" y="62"/>
-                    <a:pt x="18" y="62"/>
-                  </a:cubicBezTo>
-                  <a:cubicBezTo>
-                    <a:pt x="18" y="65"/>
-                    <a:pt x="16" y="67"/>
-                    <a:pt x="14" y="67"/>
-                  </a:cubicBezTo>
-                  <a:cubicBezTo>
-                    <a:pt x="11" y="67"/>
-                    <a:pt x="9" y="65"/>
-                    <a:pt x="9" y="62"/>
-                  </a:cubicBezTo>
-                  <a:cubicBezTo>
-                    <a:pt x="9" y="28"/>
-                    <a:pt x="9" y="28"/>
-                    <a:pt x="9" y="28"/>
-                  </a:cubicBezTo>
-                  <a:cubicBezTo>
-                    <a:pt x="7" y="28"/>
-                    <a:pt x="7" y="28"/>
-                    <a:pt x="7" y="28"/>
-                  </a:cubicBezTo>
-                  <a:cubicBezTo>
-                    <a:pt x="7" y="41"/>
-                    <a:pt x="7" y="41"/>
-                    <a:pt x="7" y="41"/>
-                  </a:cubicBezTo>
-                  <a:cubicBezTo>
-                    <a:pt x="7" y="43"/>
-                    <a:pt x="5" y="45"/>
-                    <a:pt x="3" y="45"/>
-                  </a:cubicBezTo>
-                  <a:cubicBezTo>
-                    <a:pt x="1" y="45"/>
-                    <a:pt x="0" y="43"/>
-                    <a:pt x="0" y="41"/>
-                  </a:cubicBezTo>
-                  <a:cubicBezTo>
-                    <a:pt x="0" y="25"/>
-                    <a:pt x="0" y="25"/>
-                    <a:pt x="0" y="25"/>
-                  </a:cubicBezTo>
-                  <a:cubicBezTo>
-                    <a:pt x="0" y="21"/>
-                    <a:pt x="3" y="18"/>
-                    <a:pt x="7" y="18"/>
-                  </a:cubicBezTo>
-                  <a:cubicBezTo>
-                    <a:pt x="31" y="18"/>
-                    <a:pt x="31" y="18"/>
-                    <a:pt x="31" y="18"/>
-                  </a:cubicBezTo>
-                  <a:cubicBezTo>
-                    <a:pt x="35" y="18"/>
-                    <a:pt x="39" y="21"/>
-                    <a:pt x="39" y="25"/>
-                  </a:cubicBezTo>
-                  <a:lnTo>
-                    <a:pt x="39" y="41"/>
-                  </a:lnTo>
-                  <a:close/>
-                  <a:moveTo>
-                    <a:pt x="19" y="17"/>
-                  </a:moveTo>
-                  <a:cubicBezTo>
-                    <a:pt x="14" y="17"/>
-                    <a:pt x="11" y="13"/>
-                    <a:pt x="11" y="8"/>
-                  </a:cubicBezTo>
-                  <a:cubicBezTo>
-                    <a:pt x="11" y="4"/>
-                    <a:pt x="14" y="0"/>
-                    <a:pt x="19" y="0"/>
-                  </a:cubicBezTo>
-                  <a:cubicBezTo>
-                    <a:pt x="24" y="0"/>
-                    <a:pt x="28" y="4"/>
-                    <a:pt x="28" y="8"/>
-                  </a:cubicBezTo>
-                  <a:cubicBezTo>
-                    <a:pt x="28" y="13"/>
-                    <a:pt x="24" y="17"/>
-                    <a:pt x="19" y="17"/>
-                  </a:cubicBezTo>
-                  <a:close/>
-                </a:path>
-              </a:pathLst>
-            </a:custGeom>
-            <a:solidFill>
-              <a:schemeClr val="tx1">
-                <a:lumMod val="65000"/>
-                <a:lumOff val="35000"/>
-              </a:schemeClr>
-            </a:solidFill>
-            <a:ln>
-              <a:noFill/>
-            </a:ln>
-          </p:spPr>
-          <p:txBody>
-            <a:bodyPr/>
-            <a:lstStyle/>
-            <a:p>
-              <a:endParaRPr lang="en-IN">
-                <a:latin typeface="Roboto" panose="02000000000000000000" pitchFamily="2" charset="0"/>
-                <a:ea typeface="Roboto" panose="02000000000000000000" pitchFamily="2" charset="0"/>
-              </a:endParaRPr>
-            </a:p>
-          </p:txBody>
-        </p:sp>
-        <p:sp>
-          <p:nvSpPr>
-            <p:cNvPr id="49" name="Oval 48">
-              <a:extLst>
-                <a:ext uri="{FF2B5EF4-FFF2-40B4-BE49-F238E27FC236}">
-                  <a16:creationId xmlns:a16="http://schemas.microsoft.com/office/drawing/2014/main" id="{DF14C0F6-5072-4053-A506-FE4F95B3C288}"/>
-                </a:ext>
-              </a:extLst>
-            </p:cNvPr>
-            <p:cNvSpPr/>
-            <p:nvPr/>
-          </p:nvSpPr>
-          <p:spPr>
-            <a:xfrm>
-              <a:off x="1918009" y="3170457"/>
-              <a:ext cx="323386" cy="323386"/>
-            </a:xfrm>
-            <a:prstGeom prst="ellipse">
-              <a:avLst/>
-            </a:prstGeom>
-            <a:solidFill>
-              <a:schemeClr val="tx1"/>
-            </a:solidFill>
-            <a:ln>
-              <a:noFill/>
-            </a:ln>
-          </p:spPr>
-          <p:style>
-            <a:lnRef idx="2">
-              <a:schemeClr val="accent1">
-                <a:shade val="50000"/>
-              </a:schemeClr>
-            </a:lnRef>
-            <a:fillRef idx="1">
-              <a:schemeClr val="accent1"/>
-            </a:fillRef>
-            <a:effectRef idx="0">
-              <a:schemeClr val="accent1"/>
-            </a:effectRef>
-            <a:fontRef idx="minor">
-              <a:schemeClr val="lt1"/>
-            </a:fontRef>
-          </p:style>
-          <p:txBody>
-            <a:bodyPr rtlCol="0" anchor="ctr"/>
-            <a:lstStyle/>
-            <a:p>
-              <a:pPr algn="ctr"/>
-              <a:r>
-                <a:rPr lang="en-US" sz="1400" b="1" dirty="0">
-                  <a:latin typeface="Roboto" panose="02000000000000000000" pitchFamily="2" charset="0"/>
-                  <a:ea typeface="Roboto" panose="02000000000000000000" pitchFamily="2" charset="0"/>
-                </a:rPr>
-                <a:t>1</a:t>
-              </a:r>
-              <a:endParaRPr lang="en-IN" sz="1400" b="1" dirty="0">
-                <a:latin typeface="Roboto" panose="02000000000000000000" pitchFamily="2" charset="0"/>
-                <a:ea typeface="Roboto" panose="02000000000000000000" pitchFamily="2" charset="0"/>
-              </a:endParaRPr>
-            </a:p>
-          </p:txBody>
-        </p:sp>
-      </p:grpSp>
-    </p:spTree>
-    <p:extLst>
-      <p:ext uri="{BB962C8B-B14F-4D97-AF65-F5344CB8AC3E}">
-        <p14:creationId xmlns:p14="http://schemas.microsoft.com/office/powerpoint/2010/main" val="68831964"/>
-      </p:ext>
-    </p:extLst>
-  </p:cSld>
-  <p:clrMapOvr>
-    <a:masterClrMapping/>
-  </p:clrMapOvr>
-</p:sld>
-</file>
-
 <file path=ppt/theme/theme1.xml><?xml version="1.0" encoding="utf-8"?>
 <a:theme xmlns:a="http://schemas.openxmlformats.org/drawingml/2006/main" name="Office Theme">
   <a:themeElements>

</xml_diff>

<commit_message>
FEAT: Use Case & figma task deletion added
</commit_message>
<xml_diff>
--- a/Diagrammes_Cas_Dusages/DiagrammeUseCase.pptx
+++ b/Diagrammes_Cas_Dusages/DiagrammeUseCase.pptx
@@ -287,7 +287,7 @@
           <a:p>
             <a:fld id="{9C6A45A9-4111-4223-A527-F9A061662887}" type="datetimeFigureOut">
               <a:rPr lang="en-IN" smtClean="0"/>
-              <a:t>25/07/23</a:t>
+              <a:t>12/08/23</a:t>
             </a:fld>
             <a:endParaRPr lang="en-IN"/>
           </a:p>
@@ -487,7 +487,7 @@
           <a:p>
             <a:fld id="{9C6A45A9-4111-4223-A527-F9A061662887}" type="datetimeFigureOut">
               <a:rPr lang="en-IN" smtClean="0"/>
-              <a:t>25/07/23</a:t>
+              <a:t>12/08/23</a:t>
             </a:fld>
             <a:endParaRPr lang="en-IN"/>
           </a:p>
@@ -697,7 +697,7 @@
           <a:p>
             <a:fld id="{9C6A45A9-4111-4223-A527-F9A061662887}" type="datetimeFigureOut">
               <a:rPr lang="en-IN" smtClean="0"/>
-              <a:t>25/07/23</a:t>
+              <a:t>12/08/23</a:t>
             </a:fld>
             <a:endParaRPr lang="en-IN"/>
           </a:p>
@@ -897,7 +897,7 @@
           <a:p>
             <a:fld id="{9C6A45A9-4111-4223-A527-F9A061662887}" type="datetimeFigureOut">
               <a:rPr lang="en-IN" smtClean="0"/>
-              <a:t>25/07/23</a:t>
+              <a:t>12/08/23</a:t>
             </a:fld>
             <a:endParaRPr lang="en-IN"/>
           </a:p>
@@ -1173,7 +1173,7 @@
           <a:p>
             <a:fld id="{9C6A45A9-4111-4223-A527-F9A061662887}" type="datetimeFigureOut">
               <a:rPr lang="en-IN" smtClean="0"/>
-              <a:t>25/07/23</a:t>
+              <a:t>12/08/23</a:t>
             </a:fld>
             <a:endParaRPr lang="en-IN"/>
           </a:p>
@@ -1441,7 +1441,7 @@
           <a:p>
             <a:fld id="{9C6A45A9-4111-4223-A527-F9A061662887}" type="datetimeFigureOut">
               <a:rPr lang="en-IN" smtClean="0"/>
-              <a:t>25/07/23</a:t>
+              <a:t>12/08/23</a:t>
             </a:fld>
             <a:endParaRPr lang="en-IN"/>
           </a:p>
@@ -1856,7 +1856,7 @@
           <a:p>
             <a:fld id="{9C6A45A9-4111-4223-A527-F9A061662887}" type="datetimeFigureOut">
               <a:rPr lang="en-IN" smtClean="0"/>
-              <a:t>25/07/23</a:t>
+              <a:t>12/08/23</a:t>
             </a:fld>
             <a:endParaRPr lang="en-IN"/>
           </a:p>
@@ -1998,7 +1998,7 @@
           <a:p>
             <a:fld id="{9C6A45A9-4111-4223-A527-F9A061662887}" type="datetimeFigureOut">
               <a:rPr lang="en-IN" smtClean="0"/>
-              <a:t>25/07/23</a:t>
+              <a:t>12/08/23</a:t>
             </a:fld>
             <a:endParaRPr lang="en-IN"/>
           </a:p>
@@ -2111,7 +2111,7 @@
           <a:p>
             <a:fld id="{9C6A45A9-4111-4223-A527-F9A061662887}" type="datetimeFigureOut">
               <a:rPr lang="en-IN" smtClean="0"/>
-              <a:t>25/07/23</a:t>
+              <a:t>12/08/23</a:t>
             </a:fld>
             <a:endParaRPr lang="en-IN"/>
           </a:p>
@@ -2424,7 +2424,7 @@
           <a:p>
             <a:fld id="{9C6A45A9-4111-4223-A527-F9A061662887}" type="datetimeFigureOut">
               <a:rPr lang="en-IN" smtClean="0"/>
-              <a:t>25/07/23</a:t>
+              <a:t>12/08/23</a:t>
             </a:fld>
             <a:endParaRPr lang="en-IN"/>
           </a:p>
@@ -2713,7 +2713,7 @@
           <a:p>
             <a:fld id="{9C6A45A9-4111-4223-A527-F9A061662887}" type="datetimeFigureOut">
               <a:rPr lang="en-IN" smtClean="0"/>
-              <a:t>25/07/23</a:t>
+              <a:t>12/08/23</a:t>
             </a:fld>
             <a:endParaRPr lang="en-IN"/>
           </a:p>
@@ -2956,7 +2956,7 @@
           <a:p>
             <a:fld id="{9C6A45A9-4111-4223-A527-F9A061662887}" type="datetimeFigureOut">
               <a:rPr lang="en-IN" smtClean="0"/>
-              <a:t>25/07/23</a:t>
+              <a:t>12/08/23</a:t>
             </a:fld>
             <a:endParaRPr lang="en-IN"/>
           </a:p>
@@ -11276,7 +11276,7 @@
         <p:spPr>
           <a:xfrm>
             <a:off x="7381385" y="252261"/>
-            <a:ext cx="3504054" cy="5747533"/>
+            <a:ext cx="3504054" cy="5564569"/>
           </a:xfrm>
           <a:prstGeom prst="rect">
             <a:avLst/>
@@ -11336,8 +11336,8 @@
         </p:nvSpPr>
         <p:spPr>
           <a:xfrm>
-            <a:off x="7535508" y="1117230"/>
-            <a:ext cx="3144605" cy="724067"/>
+            <a:off x="7535508" y="851744"/>
+            <a:ext cx="3144605" cy="378852"/>
           </a:xfrm>
           <a:prstGeom prst="ellipse">
             <a:avLst/>
@@ -11368,7 +11368,7 @@
           <a:p>
             <a:pPr algn="ctr"/>
             <a:r>
-              <a:rPr lang="en-IN" sz="1400" dirty="0">
+              <a:rPr lang="en-IN" sz="1200" dirty="0">
                 <a:solidFill>
                   <a:schemeClr val="tx1"/>
                 </a:solidFill>
@@ -11394,8 +11394,8 @@
         </p:nvSpPr>
         <p:spPr>
           <a:xfrm>
-            <a:off x="7554912" y="2011972"/>
-            <a:ext cx="3144605" cy="722766"/>
+            <a:off x="7535507" y="1427900"/>
+            <a:ext cx="3144605" cy="708492"/>
           </a:xfrm>
           <a:prstGeom prst="ellipse">
             <a:avLst/>
@@ -11432,7 +11432,7 @@
           <a:p>
             <a:pPr algn="ctr"/>
             <a:r>
-              <a:rPr lang="en-US" sz="1400" dirty="0" err="1">
+              <a:rPr lang="en-US" sz="1200" dirty="0" err="1">
                 <a:solidFill>
                   <a:schemeClr val="tx1"/>
                 </a:solidFill>
@@ -11442,7 +11442,7 @@
               <a:t>Ajout</a:t>
             </a:r>
             <a:r>
-              <a:rPr lang="en-US" sz="1400" dirty="0">
+              <a:rPr lang="en-US" sz="1200" dirty="0">
                 <a:solidFill>
                   <a:schemeClr val="tx1"/>
                 </a:solidFill>
@@ -11452,7 +11452,7 @@
               <a:t> </a:t>
             </a:r>
             <a:r>
-              <a:rPr lang="en-US" sz="1400" dirty="0" err="1">
+              <a:rPr lang="en-US" sz="1200" dirty="0" err="1">
                 <a:solidFill>
                   <a:schemeClr val="tx1"/>
                 </a:solidFill>
@@ -11462,7 +11462,7 @@
               <a:t>d’une</a:t>
             </a:r>
             <a:r>
-              <a:rPr lang="en-US" sz="1400" dirty="0">
+              <a:rPr lang="en-US" sz="1200" dirty="0">
                 <a:solidFill>
                   <a:schemeClr val="tx1"/>
                 </a:solidFill>
@@ -11472,7 +11472,7 @@
               <a:t> nouvelle </a:t>
             </a:r>
             <a:r>
-              <a:rPr lang="en-US" sz="1400" dirty="0" err="1">
+              <a:rPr lang="en-US" sz="1200" dirty="0" err="1">
                 <a:solidFill>
                   <a:schemeClr val="tx1"/>
                 </a:solidFill>
@@ -11482,7 +11482,7 @@
               <a:t>tâche</a:t>
             </a:r>
             <a:r>
-              <a:rPr lang="en-US" sz="1400" dirty="0">
+              <a:rPr lang="en-US" sz="1200" dirty="0">
                 <a:solidFill>
                   <a:schemeClr val="tx1"/>
                 </a:solidFill>
@@ -11492,7 +11492,7 @@
               <a:t> sur son </a:t>
             </a:r>
             <a:r>
-              <a:rPr lang="en-US" sz="1400" dirty="0" err="1">
+              <a:rPr lang="en-US" sz="1200" dirty="0" err="1">
                 <a:solidFill>
                   <a:schemeClr val="tx1"/>
                 </a:solidFill>
@@ -11501,7 +11501,7 @@
               </a:rPr>
               <a:t>compte</a:t>
             </a:r>
-            <a:endParaRPr lang="en-IN" sz="1400" dirty="0">
+            <a:endParaRPr lang="en-IN" sz="1200" dirty="0">
               <a:solidFill>
                 <a:schemeClr val="tx1"/>
               </a:solidFill>
@@ -11572,8 +11572,8 @@
         </p:nvCxnSpPr>
         <p:spPr>
           <a:xfrm flipV="1">
-            <a:off x="6403983" y="1479264"/>
-            <a:ext cx="1131525" cy="1603897"/>
+            <a:off x="6403983" y="1041170"/>
+            <a:ext cx="1131525" cy="2041991"/>
           </a:xfrm>
           <a:prstGeom prst="line">
             <a:avLst/>
@@ -11620,8 +11620,8 @@
         </p:nvCxnSpPr>
         <p:spPr>
           <a:xfrm flipV="1">
-            <a:off x="6403983" y="2373355"/>
-            <a:ext cx="1150929" cy="709806"/>
+            <a:off x="6403983" y="1782146"/>
+            <a:ext cx="1131524" cy="1301015"/>
           </a:xfrm>
           <a:prstGeom prst="line">
             <a:avLst/>
@@ -12328,7 +12328,7 @@
         <p:spPr>
           <a:xfrm>
             <a:off x="7564017" y="4021266"/>
-            <a:ext cx="3144605" cy="722766"/>
+            <a:ext cx="3144605" cy="560586"/>
           </a:xfrm>
           <a:prstGeom prst="ellipse">
             <a:avLst/>
@@ -12365,7 +12365,7 @@
           <a:p>
             <a:pPr algn="ctr"/>
             <a:r>
-              <a:rPr lang="en-US" sz="1400" dirty="0">
+              <a:rPr lang="en-US" sz="1200" dirty="0">
                 <a:solidFill>
                   <a:schemeClr val="tx1"/>
                 </a:solidFill>
@@ -12375,7 +12375,7 @@
               <a:t>Recherche de taches </a:t>
             </a:r>
             <a:r>
-              <a:rPr lang="en-US" sz="1400" dirty="0" err="1">
+              <a:rPr lang="en-US" sz="1200" dirty="0" err="1">
                 <a:solidFill>
                   <a:schemeClr val="tx1"/>
                 </a:solidFill>
@@ -12384,7 +12384,7 @@
               </a:rPr>
               <a:t>spécifique</a:t>
             </a:r>
-            <a:endParaRPr lang="en-IN" sz="1400" dirty="0">
+            <a:endParaRPr lang="en-IN" sz="1200" dirty="0">
               <a:solidFill>
                 <a:schemeClr val="tx1"/>
               </a:solidFill>
@@ -12413,7 +12413,7 @@
         <p:spPr>
           <a:xfrm>
             <a:off x="6403983" y="3083161"/>
-            <a:ext cx="1160034" cy="1299488"/>
+            <a:ext cx="1160034" cy="1218398"/>
           </a:xfrm>
           <a:prstGeom prst="line">
             <a:avLst/>
@@ -12456,8 +12456,8 @@
         </p:nvSpPr>
         <p:spPr>
           <a:xfrm>
-            <a:off x="7564017" y="3026082"/>
-            <a:ext cx="3144605" cy="722766"/>
+            <a:off x="7564017" y="3188262"/>
+            <a:ext cx="3144605" cy="560586"/>
           </a:xfrm>
           <a:prstGeom prst="ellipse">
             <a:avLst/>
@@ -12494,7 +12494,7 @@
           <a:p>
             <a:pPr algn="ctr"/>
             <a:r>
-              <a:rPr lang="en-US" sz="1400" dirty="0" err="1">
+              <a:rPr lang="en-US" sz="1200" dirty="0" err="1">
                 <a:solidFill>
                   <a:schemeClr val="tx1"/>
                 </a:solidFill>
@@ -12504,7 +12504,7 @@
               <a:t>Classement</a:t>
             </a:r>
             <a:r>
-              <a:rPr lang="en-US" sz="1400" dirty="0">
+              <a:rPr lang="en-US" sz="1200" dirty="0">
                 <a:solidFill>
                   <a:schemeClr val="tx1"/>
                 </a:solidFill>
@@ -12514,7 +12514,7 @@
               <a:t> des taches par </a:t>
             </a:r>
             <a:r>
-              <a:rPr lang="en-US" sz="1400" dirty="0" err="1">
+              <a:rPr lang="en-US" sz="1200" dirty="0" err="1">
                 <a:solidFill>
                   <a:schemeClr val="tx1"/>
                 </a:solidFill>
@@ -12523,7 +12523,7 @@
               </a:rPr>
               <a:t>statut</a:t>
             </a:r>
-            <a:endParaRPr lang="en-IN" sz="1400" dirty="0">
+            <a:endParaRPr lang="en-IN" sz="1200" dirty="0">
               <a:solidFill>
                 <a:schemeClr val="tx1"/>
               </a:solidFill>
@@ -12547,8 +12547,8 @@
         </p:nvSpPr>
         <p:spPr>
           <a:xfrm>
-            <a:off x="7535507" y="5010331"/>
-            <a:ext cx="3144605" cy="722766"/>
+            <a:off x="7535506" y="4850868"/>
+            <a:ext cx="3144605" cy="560586"/>
           </a:xfrm>
           <a:prstGeom prst="ellipse">
             <a:avLst/>
@@ -12584,7 +12584,7 @@
           <a:p>
             <a:pPr algn="ctr"/>
             <a:r>
-              <a:rPr lang="en-US" sz="1400" dirty="0" err="1">
+              <a:rPr lang="en-US" sz="1200" dirty="0" err="1">
                 <a:solidFill>
                   <a:schemeClr val="tx1"/>
                 </a:solidFill>
@@ -12594,7 +12594,7 @@
               <a:t>Ajout</a:t>
             </a:r>
             <a:r>
-              <a:rPr lang="en-US" sz="1400" dirty="0">
+              <a:rPr lang="en-US" sz="1200" dirty="0">
                 <a:solidFill>
                   <a:schemeClr val="tx1"/>
                 </a:solidFill>
@@ -12604,7 +12604,7 @@
               <a:t> </a:t>
             </a:r>
             <a:r>
-              <a:rPr lang="en-US" sz="1400" dirty="0" err="1">
+              <a:rPr lang="en-US" sz="1200" dirty="0" err="1">
                 <a:solidFill>
                   <a:schemeClr val="tx1"/>
                 </a:solidFill>
@@ -12614,7 +12614,7 @@
               <a:t>d’une</a:t>
             </a:r>
             <a:r>
-              <a:rPr lang="en-US" sz="1400" dirty="0">
+              <a:rPr lang="en-US" sz="1200" dirty="0">
                 <a:solidFill>
                   <a:schemeClr val="tx1"/>
                 </a:solidFill>
@@ -12624,7 +12624,7 @@
               <a:t> </a:t>
             </a:r>
             <a:r>
-              <a:rPr lang="en-US" sz="1400" dirty="0" err="1">
+              <a:rPr lang="en-US" sz="1200" dirty="0" err="1">
                 <a:solidFill>
                   <a:schemeClr val="tx1"/>
                 </a:solidFill>
@@ -12634,7 +12634,7 @@
               <a:t>tâche</a:t>
             </a:r>
             <a:r>
-              <a:rPr lang="en-US" sz="1400" dirty="0">
+              <a:rPr lang="en-US" sz="1200" dirty="0">
                 <a:solidFill>
                   <a:schemeClr val="tx1"/>
                 </a:solidFill>
@@ -12644,7 +12644,7 @@
               <a:t> </a:t>
             </a:r>
             <a:r>
-              <a:rPr lang="en-US" sz="1400" dirty="0" err="1">
+              <a:rPr lang="en-US" sz="1200" dirty="0" err="1">
                 <a:solidFill>
                   <a:schemeClr val="tx1"/>
                 </a:solidFill>
@@ -12654,7 +12654,7 @@
               <a:t>à</a:t>
             </a:r>
             <a:r>
-              <a:rPr lang="en-US" sz="1400" dirty="0">
+              <a:rPr lang="en-US" sz="1200" dirty="0">
                 <a:solidFill>
                   <a:schemeClr val="tx1"/>
                 </a:solidFill>
@@ -12664,7 +12664,7 @@
               <a:t> un </a:t>
             </a:r>
             <a:r>
-              <a:rPr lang="en-US" sz="1400" dirty="0" err="1">
+              <a:rPr lang="en-US" sz="1200" dirty="0" err="1">
                 <a:solidFill>
                   <a:schemeClr val="tx1"/>
                 </a:solidFill>
@@ -12673,7 +12673,7 @@
               </a:rPr>
               <a:t>élève</a:t>
             </a:r>
-            <a:endParaRPr lang="en-IN" sz="1400" dirty="0">
+            <a:endParaRPr lang="en-IN" sz="1200" dirty="0">
               <a:solidFill>
                 <a:schemeClr val="tx1"/>
               </a:solidFill>
@@ -12700,9 +12700,235 @@
           <p:nvPr/>
         </p:nvCxnSpPr>
         <p:spPr>
+          <a:xfrm flipV="1">
+            <a:off x="4870236" y="5131161"/>
+            <a:ext cx="2665270" cy="168724"/>
+          </a:xfrm>
+          <a:prstGeom prst="line">
+            <a:avLst/>
+          </a:prstGeom>
+          <a:ln w="19050">
+            <a:solidFill>
+              <a:schemeClr val="bg1">
+                <a:lumMod val="50000"/>
+              </a:schemeClr>
+            </a:solidFill>
+            <a:prstDash val="sysDot"/>
+          </a:ln>
+        </p:spPr>
+        <p:style>
+          <a:lnRef idx="1">
+            <a:schemeClr val="accent1"/>
+          </a:lnRef>
+          <a:fillRef idx="0">
+            <a:schemeClr val="accent1"/>
+          </a:fillRef>
+          <a:effectRef idx="0">
+            <a:schemeClr val="accent1"/>
+          </a:effectRef>
+          <a:fontRef idx="minor">
+            <a:schemeClr val="tx1"/>
+          </a:fontRef>
+        </p:style>
+      </p:cxnSp>
+      <p:sp>
+        <p:nvSpPr>
+          <p:cNvPr id="27" name="Oval 7">
+            <a:extLst>
+              <a:ext uri="{FF2B5EF4-FFF2-40B4-BE49-F238E27FC236}">
+                <a16:creationId xmlns:a16="http://schemas.microsoft.com/office/drawing/2014/main" id="{EB677770-977A-6B37-C5FC-D036F1BE2B6F}"/>
+              </a:ext>
+            </a:extLst>
+          </p:cNvPr>
+          <p:cNvSpPr/>
+          <p:nvPr/>
+        </p:nvSpPr>
+        <p:spPr>
           <a:xfrm>
-            <a:off x="4870236" y="5299885"/>
-            <a:ext cx="2665271" cy="71829"/>
+            <a:off x="7533456" y="2326053"/>
+            <a:ext cx="3144605" cy="708492"/>
+          </a:xfrm>
+          <a:prstGeom prst="ellipse">
+            <a:avLst/>
+          </a:prstGeom>
+          <a:solidFill>
+            <a:schemeClr val="accent2">
+              <a:lumMod val="60000"/>
+              <a:lumOff val="40000"/>
+            </a:schemeClr>
+          </a:solidFill>
+          <a:ln>
+            <a:noFill/>
+          </a:ln>
+        </p:spPr>
+        <p:style>
+          <a:lnRef idx="2">
+            <a:schemeClr val="accent1">
+              <a:shade val="50000"/>
+            </a:schemeClr>
+          </a:lnRef>
+          <a:fillRef idx="1">
+            <a:schemeClr val="accent1"/>
+          </a:fillRef>
+          <a:effectRef idx="0">
+            <a:schemeClr val="accent1"/>
+          </a:effectRef>
+          <a:fontRef idx="minor">
+            <a:schemeClr val="lt1"/>
+          </a:fontRef>
+        </p:style>
+        <p:txBody>
+          <a:bodyPr rtlCol="0" anchor="ctr"/>
+          <a:lstStyle/>
+          <a:p>
+            <a:pPr algn="ctr"/>
+            <a:r>
+              <a:rPr lang="en-US" sz="1200" dirty="0" err="1">
+                <a:solidFill>
+                  <a:schemeClr val="tx1"/>
+                </a:solidFill>
+                <a:latin typeface="Roboto" panose="02000000000000000000" pitchFamily="2" charset="0"/>
+                <a:ea typeface="Roboto" panose="02000000000000000000" pitchFamily="2" charset="0"/>
+              </a:rPr>
+              <a:t>Supprimer</a:t>
+            </a:r>
+            <a:r>
+              <a:rPr lang="en-US" sz="1200" dirty="0">
+                <a:solidFill>
+                  <a:schemeClr val="tx1"/>
+                </a:solidFill>
+                <a:latin typeface="Roboto" panose="02000000000000000000" pitchFamily="2" charset="0"/>
+                <a:ea typeface="Roboto" panose="02000000000000000000" pitchFamily="2" charset="0"/>
+              </a:rPr>
+              <a:t> </a:t>
+            </a:r>
+            <a:r>
+              <a:rPr lang="en-US" sz="1200" dirty="0" err="1">
+                <a:solidFill>
+                  <a:schemeClr val="tx1"/>
+                </a:solidFill>
+                <a:latin typeface="Roboto" panose="02000000000000000000" pitchFamily="2" charset="0"/>
+                <a:ea typeface="Roboto" panose="02000000000000000000" pitchFamily="2" charset="0"/>
+              </a:rPr>
+              <a:t>une</a:t>
+            </a:r>
+            <a:r>
+              <a:rPr lang="en-US" sz="1200" dirty="0">
+                <a:solidFill>
+                  <a:schemeClr val="tx1"/>
+                </a:solidFill>
+                <a:latin typeface="Roboto" panose="02000000000000000000" pitchFamily="2" charset="0"/>
+                <a:ea typeface="Roboto" panose="02000000000000000000" pitchFamily="2" charset="0"/>
+              </a:rPr>
+              <a:t> nouvelle </a:t>
+            </a:r>
+            <a:r>
+              <a:rPr lang="en-US" sz="1200" dirty="0" err="1">
+                <a:solidFill>
+                  <a:schemeClr val="tx1"/>
+                </a:solidFill>
+                <a:latin typeface="Roboto" panose="02000000000000000000" pitchFamily="2" charset="0"/>
+                <a:ea typeface="Roboto" panose="02000000000000000000" pitchFamily="2" charset="0"/>
+              </a:rPr>
+              <a:t>tâche</a:t>
+            </a:r>
+            <a:r>
+              <a:rPr lang="en-US" sz="1200" dirty="0">
+                <a:solidFill>
+                  <a:schemeClr val="tx1"/>
+                </a:solidFill>
+                <a:latin typeface="Roboto" panose="02000000000000000000" pitchFamily="2" charset="0"/>
+                <a:ea typeface="Roboto" panose="02000000000000000000" pitchFamily="2" charset="0"/>
+              </a:rPr>
+              <a:t> sur son </a:t>
+            </a:r>
+            <a:r>
+              <a:rPr lang="en-US" sz="1200" dirty="0" err="1">
+                <a:solidFill>
+                  <a:schemeClr val="tx1"/>
+                </a:solidFill>
+                <a:latin typeface="Roboto" panose="02000000000000000000" pitchFamily="2" charset="0"/>
+                <a:ea typeface="Roboto" panose="02000000000000000000" pitchFamily="2" charset="0"/>
+              </a:rPr>
+              <a:t>compte</a:t>
+            </a:r>
+            <a:endParaRPr lang="en-IN" sz="1200" dirty="0">
+              <a:solidFill>
+                <a:schemeClr val="tx1"/>
+              </a:solidFill>
+              <a:latin typeface="Roboto" panose="02000000000000000000" pitchFamily="2" charset="0"/>
+              <a:ea typeface="Roboto" panose="02000000000000000000" pitchFamily="2" charset="0"/>
+            </a:endParaRPr>
+          </a:p>
+        </p:txBody>
+      </p:sp>
+      <p:cxnSp>
+        <p:nvCxnSpPr>
+          <p:cNvPr id="33" name="Straight Connector 24">
+            <a:extLst>
+              <a:ext uri="{FF2B5EF4-FFF2-40B4-BE49-F238E27FC236}">
+                <a16:creationId xmlns:a16="http://schemas.microsoft.com/office/drawing/2014/main" id="{60365AE4-AED5-780C-DF16-C98841B07B8B}"/>
+              </a:ext>
+            </a:extLst>
+          </p:cNvPr>
+          <p:cNvCxnSpPr>
+            <a:cxnSpLocks/>
+            <a:stCxn id="38" idx="3"/>
+            <a:endCxn id="41" idx="2"/>
+          </p:cNvCxnSpPr>
+          <p:nvPr/>
+        </p:nvCxnSpPr>
+        <p:spPr>
+          <a:xfrm>
+            <a:off x="6403983" y="3083161"/>
+            <a:ext cx="1160034" cy="385394"/>
+          </a:xfrm>
+          <a:prstGeom prst="line">
+            <a:avLst/>
+          </a:prstGeom>
+          <a:ln w="19050">
+            <a:solidFill>
+              <a:schemeClr val="bg1">
+                <a:lumMod val="50000"/>
+              </a:schemeClr>
+            </a:solidFill>
+            <a:prstDash val="sysDot"/>
+          </a:ln>
+        </p:spPr>
+        <p:style>
+          <a:lnRef idx="1">
+            <a:schemeClr val="accent1"/>
+          </a:lnRef>
+          <a:fillRef idx="0">
+            <a:schemeClr val="accent1"/>
+          </a:fillRef>
+          <a:effectRef idx="0">
+            <a:schemeClr val="accent1"/>
+          </a:effectRef>
+          <a:fontRef idx="minor">
+            <a:schemeClr val="tx1"/>
+          </a:fontRef>
+        </p:style>
+      </p:cxnSp>
+      <p:cxnSp>
+        <p:nvCxnSpPr>
+          <p:cNvPr id="36" name="Straight Connector 24">
+            <a:extLst>
+              <a:ext uri="{FF2B5EF4-FFF2-40B4-BE49-F238E27FC236}">
+                <a16:creationId xmlns:a16="http://schemas.microsoft.com/office/drawing/2014/main" id="{514B0607-732A-B2DF-AEFE-0A3C736FA17A}"/>
+              </a:ext>
+            </a:extLst>
+          </p:cNvPr>
+          <p:cNvCxnSpPr>
+            <a:cxnSpLocks/>
+            <a:stCxn id="38" idx="3"/>
+          </p:cNvCxnSpPr>
+          <p:nvPr/>
+        </p:nvCxnSpPr>
+        <p:spPr>
+          <a:xfrm flipV="1">
+            <a:off x="6403983" y="2685701"/>
+            <a:ext cx="1080694" cy="397460"/>
           </a:xfrm>
           <a:prstGeom prst="line">
             <a:avLst/>

</xml_diff>